<commit_message>
Revert "pull newest commits"
</commit_message>
<xml_diff>
--- a/doc/架构图.pptx
+++ b/doc/架构图.pptx
@@ -5,13 +5,12 @@
     <p:sldMasterId id="2147483648" r:id="rId1"/>
   </p:sldMasterIdLst>
   <p:notesMasterIdLst>
-    <p:notesMasterId r:id="rId6"/>
+    <p:notesMasterId r:id="rId5"/>
   </p:notesMasterIdLst>
   <p:sldIdLst>
     <p:sldId id="259" r:id="rId2"/>
     <p:sldId id="258" r:id="rId3"/>
     <p:sldId id="260" r:id="rId4"/>
-    <p:sldId id="261" r:id="rId5"/>
   </p:sldIdLst>
   <p:sldSz cx="12192000" cy="6858000"/>
   <p:notesSz cx="6858000" cy="9144000"/>
@@ -200,7 +199,7 @@
           <a:p>
             <a:fld id="{D2A48B96-639E-45A3-A0BA-2464DFDB1FAA}" type="datetimeFigureOut">
               <a:rPr lang="zh-CN" altLang="en-US" smtClean="0"/>
-              <a:t>17/5/7</a:t>
+              <a:t>16/10/3</a:t>
             </a:fld>
             <a:endParaRPr lang="zh-CN" altLang="en-US"/>
           </a:p>
@@ -613,267 +612,6 @@
 </p:notes>
 </file>
 
-<file path=ppt/notesSlides/notesSlide3.xml><?xml version="1.0" encoding="utf-8"?>
-<p:notes xmlns:a="http://schemas.openxmlformats.org/drawingml/2006/main" xmlns:r="http://schemas.openxmlformats.org/officeDocument/2006/relationships" xmlns:p="http://schemas.openxmlformats.org/presentationml/2006/main">
-  <p:cSld>
-    <p:spTree>
-      <p:nvGrpSpPr>
-        <p:cNvPr id="1" name=""/>
-        <p:cNvGrpSpPr/>
-        <p:nvPr/>
-      </p:nvGrpSpPr>
-      <p:grpSpPr>
-        <a:xfrm>
-          <a:off x="0" y="0"/>
-          <a:ext cx="0" cy="0"/>
-          <a:chOff x="0" y="0"/>
-          <a:chExt cx="0" cy="0"/>
-        </a:xfrm>
-      </p:grpSpPr>
-      <p:sp>
-        <p:nvSpPr>
-          <p:cNvPr id="8193" name="幻灯片图像占位符 1"/>
-          <p:cNvSpPr>
-            <a:spLocks noGrp="1" noRot="1" noChangeAspect="1" noTextEdit="1"/>
-          </p:cNvSpPr>
-          <p:nvPr>
-            <p:ph type="sldImg"/>
-          </p:nvPr>
-        </p:nvSpPr>
-        <p:spPr bwMode="auto">
-          <a:noFill/>
-          <a:ln>
-            <a:solidFill>
-              <a:srgbClr val="000000"/>
-            </a:solidFill>
-            <a:miter lim="800000"/>
-            <a:headEnd/>
-            <a:tailEnd/>
-          </a:ln>
-          <a:extLst>
-            <a:ext uri="{909E8E84-426E-40DD-AFC4-6F175D3DCCD1}">
-              <a14:hiddenFill xmlns:a14="http://schemas.microsoft.com/office/drawing/2010/main">
-                <a:solidFill>
-                  <a:srgbClr val="FFFFFF"/>
-                </a:solidFill>
-              </a14:hiddenFill>
-            </a:ext>
-            <a:ext uri="{FAA26D3D-D897-4be2-8F04-BA451C77F1D7}">
-              <ma14:placeholderFlag xmlns:ma14="http://schemas.microsoft.com/office/mac/drawingml/2011/main" val="1"/>
-            </a:ext>
-          </a:extLst>
-        </p:spPr>
-      </p:sp>
-      <p:sp>
-        <p:nvSpPr>
-          <p:cNvPr id="8194" name="备注占位符 2"/>
-          <p:cNvSpPr>
-            <a:spLocks noGrp="1"/>
-          </p:cNvSpPr>
-          <p:nvPr>
-            <p:ph type="body" idx="1"/>
-          </p:nvPr>
-        </p:nvSpPr>
-        <p:spPr bwMode="auto">
-          <a:noFill/>
-          <a:extLst>
-            <a:ext uri="{909E8E84-426E-40DD-AFC4-6F175D3DCCD1}">
-              <a14:hiddenFill xmlns:a14="http://schemas.microsoft.com/office/drawing/2010/main">
-                <a:solidFill>
-                  <a:srgbClr val="FFFFFF"/>
-                </a:solidFill>
-              </a14:hiddenFill>
-            </a:ext>
-            <a:ext uri="{91240B29-F687-4F45-9708-019B960494DF}">
-              <a14:hiddenLine xmlns:a14="http://schemas.microsoft.com/office/drawing/2010/main" w="9525">
-                <a:solidFill>
-                  <a:srgbClr val="000000"/>
-                </a:solidFill>
-                <a:miter lim="800000"/>
-                <a:headEnd/>
-                <a:tailEnd/>
-              </a14:hiddenLine>
-            </a:ext>
-            <a:ext uri="{FAA26D3D-D897-4be2-8F04-BA451C77F1D7}">
-              <ma14:placeholderFlag xmlns:ma14="http://schemas.microsoft.com/office/mac/drawingml/2011/main" val="1"/>
-            </a:ext>
-          </a:extLst>
-        </p:spPr>
-        <p:txBody>
-          <a:bodyPr/>
-          <a:lstStyle/>
-          <a:p>
-            <a:endParaRPr kumimoji="0" lang="zh-CN" altLang="en-US" dirty="0">
-              <a:latin typeface="Arial" charset="0"/>
-              <a:ea typeface="ＭＳ Ｐゴシック" charset="-128"/>
-            </a:endParaRPr>
-          </a:p>
-        </p:txBody>
-      </p:sp>
-      <p:sp>
-        <p:nvSpPr>
-          <p:cNvPr id="8195" name="灯片编号占位符 3"/>
-          <p:cNvSpPr>
-            <a:spLocks noGrp="1"/>
-          </p:cNvSpPr>
-          <p:nvPr>
-            <p:ph type="sldNum" sz="quarter" idx="5"/>
-          </p:nvPr>
-        </p:nvSpPr>
-        <p:spPr bwMode="auto">
-          <a:noFill/>
-          <a:extLst>
-            <a:ext uri="{909E8E84-426E-40DD-AFC4-6F175D3DCCD1}">
-              <a14:hiddenFill xmlns:a14="http://schemas.microsoft.com/office/drawing/2010/main">
-                <a:solidFill>
-                  <a:srgbClr val="FFFFFF"/>
-                </a:solidFill>
-              </a14:hiddenFill>
-            </a:ext>
-            <a:ext uri="{91240B29-F687-4F45-9708-019B960494DF}">
-              <a14:hiddenLine xmlns:a14="http://schemas.microsoft.com/office/drawing/2010/main" w="9525">
-                <a:solidFill>
-                  <a:srgbClr val="000000"/>
-                </a:solidFill>
-                <a:miter lim="800000"/>
-                <a:headEnd/>
-                <a:tailEnd/>
-              </a14:hiddenLine>
-            </a:ext>
-          </a:extLst>
-        </p:spPr>
-        <p:txBody>
-          <a:bodyPr/>
-          <a:lstStyle>
-            <a:lvl1pPr>
-              <a:defRPr sz="2400">
-                <a:solidFill>
-                  <a:schemeClr val="tx1"/>
-                </a:solidFill>
-                <a:latin typeface="Arial" charset="0"/>
-                <a:ea typeface="宋体" charset="0"/>
-              </a:defRPr>
-            </a:lvl1pPr>
-            <a:lvl2pPr marL="742950" indent="-285750">
-              <a:defRPr sz="2400">
-                <a:solidFill>
-                  <a:schemeClr val="tx1"/>
-                </a:solidFill>
-                <a:latin typeface="Arial" charset="0"/>
-                <a:ea typeface="宋体" charset="0"/>
-              </a:defRPr>
-            </a:lvl2pPr>
-            <a:lvl3pPr marL="1143000" indent="-228600">
-              <a:defRPr sz="2400">
-                <a:solidFill>
-                  <a:schemeClr val="tx1"/>
-                </a:solidFill>
-                <a:latin typeface="Arial" charset="0"/>
-                <a:ea typeface="宋体" charset="0"/>
-              </a:defRPr>
-            </a:lvl3pPr>
-            <a:lvl4pPr marL="1600200" indent="-228600">
-              <a:defRPr sz="2400">
-                <a:solidFill>
-                  <a:schemeClr val="tx1"/>
-                </a:solidFill>
-                <a:latin typeface="Arial" charset="0"/>
-                <a:ea typeface="宋体" charset="0"/>
-              </a:defRPr>
-            </a:lvl4pPr>
-            <a:lvl5pPr marL="2057400" indent="-228600">
-              <a:defRPr sz="2400">
-                <a:solidFill>
-                  <a:schemeClr val="tx1"/>
-                </a:solidFill>
-                <a:latin typeface="Arial" charset="0"/>
-                <a:ea typeface="宋体" charset="0"/>
-              </a:defRPr>
-            </a:lvl5pPr>
-            <a:lvl6pPr marL="2514600" indent="-228600" eaLnBrk="0" fontAlgn="base" hangingPunct="0">
-              <a:spcBef>
-                <a:spcPct val="0"/>
-              </a:spcBef>
-              <a:spcAft>
-                <a:spcPct val="0"/>
-              </a:spcAft>
-              <a:defRPr sz="2400">
-                <a:solidFill>
-                  <a:schemeClr val="tx1"/>
-                </a:solidFill>
-                <a:latin typeface="Arial" charset="0"/>
-                <a:ea typeface="宋体" charset="0"/>
-              </a:defRPr>
-            </a:lvl6pPr>
-            <a:lvl7pPr marL="2971800" indent="-228600" eaLnBrk="0" fontAlgn="base" hangingPunct="0">
-              <a:spcBef>
-                <a:spcPct val="0"/>
-              </a:spcBef>
-              <a:spcAft>
-                <a:spcPct val="0"/>
-              </a:spcAft>
-              <a:defRPr sz="2400">
-                <a:solidFill>
-                  <a:schemeClr val="tx1"/>
-                </a:solidFill>
-                <a:latin typeface="Arial" charset="0"/>
-                <a:ea typeface="宋体" charset="0"/>
-              </a:defRPr>
-            </a:lvl7pPr>
-            <a:lvl8pPr marL="3429000" indent="-228600" eaLnBrk="0" fontAlgn="base" hangingPunct="0">
-              <a:spcBef>
-                <a:spcPct val="0"/>
-              </a:spcBef>
-              <a:spcAft>
-                <a:spcPct val="0"/>
-              </a:spcAft>
-              <a:defRPr sz="2400">
-                <a:solidFill>
-                  <a:schemeClr val="tx1"/>
-                </a:solidFill>
-                <a:latin typeface="Arial" charset="0"/>
-                <a:ea typeface="宋体" charset="0"/>
-              </a:defRPr>
-            </a:lvl8pPr>
-            <a:lvl9pPr marL="3886200" indent="-228600" eaLnBrk="0" fontAlgn="base" hangingPunct="0">
-              <a:spcBef>
-                <a:spcPct val="0"/>
-              </a:spcBef>
-              <a:spcAft>
-                <a:spcPct val="0"/>
-              </a:spcAft>
-              <a:defRPr sz="2400">
-                <a:solidFill>
-                  <a:schemeClr val="tx1"/>
-                </a:solidFill>
-                <a:latin typeface="Arial" charset="0"/>
-                <a:ea typeface="宋体" charset="0"/>
-              </a:defRPr>
-            </a:lvl9pPr>
-          </a:lstStyle>
-          <a:p>
-            <a:fld id="{80DF3984-D036-8146-80F3-60605DE9315C}" type="slidenum">
-              <a:rPr lang="zh-CN" altLang="en-US" sz="1200"/>
-              <a:pPr/>
-              <a:t>4</a:t>
-            </a:fld>
-            <a:endParaRPr lang="zh-CN" altLang="en-US" sz="1200"/>
-          </a:p>
-        </p:txBody>
-      </p:sp>
-    </p:spTree>
-    <p:extLst>
-      <p:ext uri="{BB962C8B-B14F-4D97-AF65-F5344CB8AC3E}">
-        <p14:creationId xmlns:p14="http://schemas.microsoft.com/office/powerpoint/2010/main" val="1595650032"/>
-      </p:ext>
-    </p:extLst>
-  </p:cSld>
-  <p:clrMapOvr>
-    <a:masterClrMapping/>
-  </p:clrMapOvr>
-</p:notes>
-</file>
-
 <file path=ppt/slideLayouts/slideLayout1.xml><?xml version="1.0" encoding="utf-8"?>
 <p:sldLayout xmlns:a="http://schemas.openxmlformats.org/drawingml/2006/main" xmlns:r="http://schemas.openxmlformats.org/officeDocument/2006/relationships" xmlns:p="http://schemas.openxmlformats.org/presentationml/2006/main" type="title" preserve="1">
   <p:cSld name="标题幻灯片">
@@ -1005,7 +743,7 @@
           <a:p>
             <a:fld id="{D997B5FA-0921-464F-AAE1-844C04324D75}" type="datetimeFigureOut">
               <a:rPr lang="zh-CN" altLang="en-US" smtClean="0"/>
-              <a:t>17/5/7</a:t>
+              <a:t>16/10/3</a:t>
             </a:fld>
             <a:endParaRPr lang="zh-CN" altLang="en-US"/>
           </a:p>
@@ -1170,7 +908,7 @@
           <a:p>
             <a:fld id="{D997B5FA-0921-464F-AAE1-844C04324D75}" type="datetimeFigureOut">
               <a:rPr lang="zh-CN" altLang="en-US" smtClean="0"/>
-              <a:t>17/5/7</a:t>
+              <a:t>16/10/3</a:t>
             </a:fld>
             <a:endParaRPr lang="zh-CN" altLang="en-US"/>
           </a:p>
@@ -1345,7 +1083,7 @@
           <a:p>
             <a:fld id="{D997B5FA-0921-464F-AAE1-844C04324D75}" type="datetimeFigureOut">
               <a:rPr lang="zh-CN" altLang="en-US" smtClean="0"/>
-              <a:t>17/5/7</a:t>
+              <a:t>16/10/3</a:t>
             </a:fld>
             <a:endParaRPr lang="zh-CN" altLang="en-US"/>
           </a:p>
@@ -1510,7 +1248,7 @@
           <a:p>
             <a:fld id="{D997B5FA-0921-464F-AAE1-844C04324D75}" type="datetimeFigureOut">
               <a:rPr lang="zh-CN" altLang="en-US" smtClean="0"/>
-              <a:t>17/5/7</a:t>
+              <a:t>16/10/3</a:t>
             </a:fld>
             <a:endParaRPr lang="zh-CN" altLang="en-US"/>
           </a:p>
@@ -1751,7 +1489,7 @@
           <a:p>
             <a:fld id="{D997B5FA-0921-464F-AAE1-844C04324D75}" type="datetimeFigureOut">
               <a:rPr lang="zh-CN" altLang="en-US" smtClean="0"/>
-              <a:t>17/5/7</a:t>
+              <a:t>16/10/3</a:t>
             </a:fld>
             <a:endParaRPr lang="zh-CN" altLang="en-US"/>
           </a:p>
@@ -1978,7 +1716,7 @@
           <a:p>
             <a:fld id="{D997B5FA-0921-464F-AAE1-844C04324D75}" type="datetimeFigureOut">
               <a:rPr lang="zh-CN" altLang="en-US" smtClean="0"/>
-              <a:t>17/5/7</a:t>
+              <a:t>16/10/3</a:t>
             </a:fld>
             <a:endParaRPr lang="zh-CN" altLang="en-US"/>
           </a:p>
@@ -2340,7 +2078,7 @@
           <a:p>
             <a:fld id="{D997B5FA-0921-464F-AAE1-844C04324D75}" type="datetimeFigureOut">
               <a:rPr lang="zh-CN" altLang="en-US" smtClean="0"/>
-              <a:t>17/5/7</a:t>
+              <a:t>16/10/3</a:t>
             </a:fld>
             <a:endParaRPr lang="zh-CN" altLang="en-US"/>
           </a:p>
@@ -2453,7 +2191,7 @@
           <a:p>
             <a:fld id="{D997B5FA-0921-464F-AAE1-844C04324D75}" type="datetimeFigureOut">
               <a:rPr lang="zh-CN" altLang="en-US" smtClean="0"/>
-              <a:t>17/5/7</a:t>
+              <a:t>16/10/3</a:t>
             </a:fld>
             <a:endParaRPr lang="zh-CN" altLang="en-US"/>
           </a:p>
@@ -2543,7 +2281,7 @@
           <a:p>
             <a:fld id="{D997B5FA-0921-464F-AAE1-844C04324D75}" type="datetimeFigureOut">
               <a:rPr lang="zh-CN" altLang="en-US" smtClean="0"/>
-              <a:t>17/5/7</a:t>
+              <a:t>16/10/3</a:t>
             </a:fld>
             <a:endParaRPr lang="zh-CN" altLang="en-US"/>
           </a:p>
@@ -2815,7 +2553,7 @@
           <a:p>
             <a:fld id="{D997B5FA-0921-464F-AAE1-844C04324D75}" type="datetimeFigureOut">
               <a:rPr lang="zh-CN" altLang="en-US" smtClean="0"/>
-              <a:t>17/5/7</a:t>
+              <a:t>16/10/3</a:t>
             </a:fld>
             <a:endParaRPr lang="zh-CN" altLang="en-US"/>
           </a:p>
@@ -3063,7 +2801,7 @@
           <a:p>
             <a:fld id="{D997B5FA-0921-464F-AAE1-844C04324D75}" type="datetimeFigureOut">
               <a:rPr lang="zh-CN" altLang="en-US" smtClean="0"/>
-              <a:t>17/5/7</a:t>
+              <a:t>16/10/3</a:t>
             </a:fld>
             <a:endParaRPr lang="zh-CN" altLang="en-US"/>
           </a:p>
@@ -3271,7 +3009,7 @@
           <a:p>
             <a:fld id="{D997B5FA-0921-464F-AAE1-844C04324D75}" type="datetimeFigureOut">
               <a:rPr lang="zh-CN" altLang="en-US" smtClean="0"/>
-              <a:t>17/5/7</a:t>
+              <a:t>16/10/3</a:t>
             </a:fld>
             <a:endParaRPr lang="zh-CN" altLang="en-US"/>
           </a:p>
@@ -7575,7 +7313,7 @@
           <a:p>
             <a:pPr algn="ctr"/>
             <a:r>
-              <a:rPr lang="zh-CN" altLang="en-US" dirty="0">
+              <a:rPr lang="zh-CN" altLang="en-US">
                 <a:latin typeface="微软雅黑" charset="0"/>
                 <a:ea typeface="微软雅黑" charset="0"/>
                 <a:sym typeface="+mn-ea"/>
@@ -7586,7 +7324,7 @@
           <a:p>
             <a:pPr algn="ctr"/>
             <a:r>
-              <a:rPr lang="en-US" altLang="zh-CN" dirty="0">
+              <a:rPr lang="en-US" altLang="zh-CN">
                 <a:latin typeface="微软雅黑" charset="0"/>
                 <a:ea typeface="微软雅黑" charset="0"/>
               </a:rPr>
@@ -7630,14 +7368,14 @@
           <a:p>
             <a:pPr algn="ctr"/>
             <a:r>
-              <a:rPr lang="zh-CN" altLang="en-US" dirty="0">
+              <a:rPr lang="zh-CN" altLang="en-US">
                 <a:latin typeface="微软雅黑" charset="0"/>
                 <a:ea typeface="微软雅黑" charset="0"/>
                 <a:sym typeface="+mn-ea"/>
               </a:rPr>
               <a:t>回调服务</a:t>
             </a:r>
-            <a:endParaRPr lang="en-US" altLang="zh-CN" dirty="0">
+            <a:endParaRPr lang="en-US" altLang="zh-CN">
               <a:latin typeface="微软雅黑" charset="0"/>
               <a:ea typeface="微软雅黑" charset="0"/>
             </a:endParaRPr>
@@ -7967,7 +7705,7 @@
           <a:p>
             <a:pPr algn="ctr"/>
             <a:r>
-              <a:rPr lang="zh-CN" altLang="en-US" dirty="0">
+              <a:rPr lang="zh-CN" altLang="en-US">
                 <a:solidFill>
                   <a:schemeClr val="tx1"/>
                 </a:solidFill>
@@ -7979,7 +7717,7 @@
           <a:p>
             <a:pPr algn="ctr"/>
             <a:r>
-              <a:rPr lang="en-US" altLang="zh-CN" dirty="0">
+              <a:rPr lang="en-US" altLang="zh-CN">
                 <a:solidFill>
                   <a:schemeClr val="tx1"/>
                 </a:solidFill>
@@ -8579,2824 +8317,6 @@
   <p:clrMapOvr>
     <a:masterClrMapping/>
   </p:clrMapOvr>
-</p:sld>
-</file>
-
-<file path=ppt/slides/slide4.xml><?xml version="1.0" encoding="utf-8"?>
-<p:sld xmlns:a="http://schemas.openxmlformats.org/drawingml/2006/main" xmlns:r="http://schemas.openxmlformats.org/officeDocument/2006/relationships" xmlns:p="http://schemas.openxmlformats.org/presentationml/2006/main">
-  <p:cSld>
-    <p:spTree>
-      <p:nvGrpSpPr>
-        <p:cNvPr id="1" name=""/>
-        <p:cNvGrpSpPr/>
-        <p:nvPr/>
-      </p:nvGrpSpPr>
-      <p:grpSpPr>
-        <a:xfrm>
-          <a:off x="0" y="0"/>
-          <a:ext cx="0" cy="0"/>
-          <a:chOff x="0" y="0"/>
-          <a:chExt cx="0" cy="0"/>
-        </a:xfrm>
-      </p:grpSpPr>
-      <p:sp>
-        <p:nvSpPr>
-          <p:cNvPr id="49" name="矩形 48"/>
-          <p:cNvSpPr/>
-          <p:nvPr/>
-        </p:nvSpPr>
-        <p:spPr>
-          <a:xfrm>
-            <a:off x="363855" y="355600"/>
-            <a:ext cx="11457940" cy="6147435"/>
-          </a:xfrm>
-          <a:prstGeom prst="rect">
-            <a:avLst/>
-          </a:prstGeom>
-          <a:pattFill prst="pct5">
-            <a:fgClr>
-              <a:schemeClr val="accent1"/>
-            </a:fgClr>
-            <a:bgClr>
-              <a:schemeClr val="bg1"/>
-            </a:bgClr>
-          </a:pattFill>
-          <a:ln w="28575" cmpd="sng">
-            <a:noFill/>
-            <a:prstDash val="dash"/>
-          </a:ln>
-        </p:spPr>
-        <p:style>
-          <a:lnRef idx="2">
-            <a:schemeClr val="accent3"/>
-          </a:lnRef>
-          <a:fillRef idx="1">
-            <a:schemeClr val="lt1"/>
-          </a:fillRef>
-          <a:effectRef idx="0">
-            <a:schemeClr val="accent3"/>
-          </a:effectRef>
-          <a:fontRef idx="minor">
-            <a:schemeClr val="dk1"/>
-          </a:fontRef>
-        </p:style>
-        <p:txBody>
-          <a:bodyPr rtlCol="0" anchor="b"/>
-          <a:lstStyle/>
-          <a:p>
-            <a:pPr algn="ctr"/>
-            <a:r>
-              <a:rPr lang="en-US" altLang="zh-CN" sz="3200" b="1" dirty="0" smtClean="0"/>
-              <a:t>XXL-JOB</a:t>
-            </a:r>
-            <a:r>
-              <a:rPr lang="zh-CN" altLang="en-US" sz="3200" b="1" dirty="0"/>
-              <a:t>架构图 </a:t>
-            </a:r>
-            <a:r>
-              <a:rPr lang="en-US" altLang="zh-CN" sz="3200" b="1" dirty="0" smtClean="0"/>
-              <a:t>v1.7</a:t>
-            </a:r>
-            <a:endParaRPr lang="en-US" altLang="zh-CN" sz="3200" b="1" dirty="0"/>
-          </a:p>
-        </p:txBody>
-      </p:sp>
-      <p:sp>
-        <p:nvSpPr>
-          <p:cNvPr id="14" name="矩形 13"/>
-          <p:cNvSpPr/>
-          <p:nvPr/>
-        </p:nvSpPr>
-        <p:spPr>
-          <a:xfrm>
-            <a:off x="622491" y="576163"/>
-            <a:ext cx="5778309" cy="4592737"/>
-          </a:xfrm>
-          <a:prstGeom prst="rect">
-            <a:avLst/>
-          </a:prstGeom>
-          <a:solidFill>
-            <a:srgbClr val="9FC2E8"/>
-          </a:solidFill>
-          <a:ln>
-            <a:noFill/>
-          </a:ln>
-        </p:spPr>
-        <p:style>
-          <a:lnRef idx="2">
-            <a:schemeClr val="accent1">
-              <a:shade val="50000"/>
-            </a:schemeClr>
-          </a:lnRef>
-          <a:fillRef idx="1">
-            <a:schemeClr val="accent1"/>
-          </a:fillRef>
-          <a:effectRef idx="0">
-            <a:schemeClr val="accent1"/>
-          </a:effectRef>
-          <a:fontRef idx="minor">
-            <a:schemeClr val="lt1"/>
-          </a:fontRef>
-        </p:style>
-        <p:txBody>
-          <a:bodyPr anchor="b"/>
-          <a:lstStyle/>
-          <a:p>
-            <a:pPr algn="ctr">
-              <a:defRPr/>
-            </a:pPr>
-            <a:r>
-              <a:rPr kumimoji="1" lang="zh-CN" altLang="en-US" sz="1600" b="1" dirty="0">
-                <a:solidFill>
-                  <a:schemeClr val="tx1"/>
-                </a:solidFill>
-                <a:latin typeface="Heiti SC Light" charset="-122"/>
-                <a:ea typeface="Heiti SC Light" charset="-122"/>
-                <a:cs typeface="Heiti SC Light" charset="-122"/>
-              </a:rPr>
-              <a:t>调度中心</a:t>
-            </a:r>
-          </a:p>
-        </p:txBody>
-      </p:sp>
-      <p:sp>
-        <p:nvSpPr>
-          <p:cNvPr id="7" name="进程 6"/>
-          <p:cNvSpPr/>
-          <p:nvPr/>
-        </p:nvSpPr>
-        <p:spPr>
-          <a:xfrm>
-            <a:off x="622491" y="5165865"/>
-            <a:ext cx="10959909" cy="586628"/>
-          </a:xfrm>
-          <a:prstGeom prst="flowChartProcess">
-            <a:avLst/>
-          </a:prstGeom>
-          <a:solidFill>
-            <a:srgbClr val="FFDCBB"/>
-          </a:solidFill>
-          <a:ln>
-            <a:noFill/>
-          </a:ln>
-        </p:spPr>
-        <p:style>
-          <a:lnRef idx="1">
-            <a:schemeClr val="accent2"/>
-          </a:lnRef>
-          <a:fillRef idx="2">
-            <a:schemeClr val="accent2"/>
-          </a:fillRef>
-          <a:effectRef idx="1">
-            <a:schemeClr val="accent2"/>
-          </a:effectRef>
-          <a:fontRef idx="minor">
-            <a:schemeClr val="dk1"/>
-          </a:fontRef>
-        </p:style>
-        <p:txBody>
-          <a:bodyPr anchor="ctr"/>
-          <a:lstStyle/>
-          <a:p>
-            <a:pPr algn="ctr">
-              <a:defRPr/>
-            </a:pPr>
-            <a:r>
-              <a:rPr kumimoji="1" lang="zh-CN" altLang="en-US" sz="1600" b="1" smtClean="0">
-                <a:latin typeface="Heiti SC Light" charset="-122"/>
-                <a:ea typeface="Heiti SC Light" charset="-122"/>
-                <a:cs typeface="Heiti SC Light" charset="-122"/>
-              </a:rPr>
-              <a:t>数据</a:t>
-            </a:r>
-            <a:r>
-              <a:rPr kumimoji="1" lang="zh-CN" altLang="en-US" sz="1600" b="1" smtClean="0">
-                <a:latin typeface="Heiti SC Light" charset="-122"/>
-                <a:ea typeface="Heiti SC Light" charset="-122"/>
-                <a:cs typeface="Heiti SC Light" charset="-122"/>
-              </a:rPr>
-              <a:t>中心</a:t>
-            </a:r>
-            <a:endParaRPr kumimoji="1" lang="zh-CN" altLang="en-US" sz="1600" b="1" dirty="0">
-              <a:latin typeface="Heiti SC Light" charset="-122"/>
-              <a:ea typeface="Heiti SC Light" charset="-122"/>
-              <a:cs typeface="Heiti SC Light" charset="-122"/>
-            </a:endParaRPr>
-          </a:p>
-        </p:txBody>
-      </p:sp>
-      <p:sp>
-        <p:nvSpPr>
-          <p:cNvPr id="9" name="矩形 8"/>
-          <p:cNvSpPr/>
-          <p:nvPr/>
-        </p:nvSpPr>
-        <p:spPr>
-          <a:xfrm>
-            <a:off x="5931089" y="7076091"/>
-            <a:ext cx="2920811" cy="841124"/>
-          </a:xfrm>
-          <a:prstGeom prst="rect">
-            <a:avLst/>
-          </a:prstGeom>
-          <a:solidFill>
-            <a:srgbClr val="E8DDF4"/>
-          </a:solidFill>
-          <a:ln>
-            <a:noFill/>
-          </a:ln>
-        </p:spPr>
-        <p:style>
-          <a:lnRef idx="1">
-            <a:schemeClr val="accent1"/>
-          </a:lnRef>
-          <a:fillRef idx="2">
-            <a:schemeClr val="accent1"/>
-          </a:fillRef>
-          <a:effectRef idx="1">
-            <a:schemeClr val="accent1"/>
-          </a:effectRef>
-          <a:fontRef idx="minor">
-            <a:schemeClr val="dk1"/>
-          </a:fontRef>
-        </p:style>
-        <p:txBody>
-          <a:bodyPr anchor="b"/>
-          <a:lstStyle/>
-          <a:p>
-            <a:pPr algn="ctr">
-              <a:defRPr/>
-            </a:pPr>
-            <a:r>
-              <a:rPr kumimoji="1" lang="zh-CN" altLang="en-US" sz="1600" b="1" dirty="0" smtClean="0">
-                <a:latin typeface="Heiti SC Light" charset="-122"/>
-                <a:ea typeface="Heiti SC Light" charset="-122"/>
-                <a:cs typeface="Heiti SC Light" charset="-122"/>
-              </a:rPr>
-              <a:t>注册中心</a:t>
-            </a:r>
-            <a:endParaRPr kumimoji="1" lang="zh-CN" altLang="en-US" sz="1600" b="1" dirty="0">
-              <a:latin typeface="Heiti SC Light" charset="-122"/>
-              <a:ea typeface="Heiti SC Light" charset="-122"/>
-              <a:cs typeface="Heiti SC Light" charset="-122"/>
-            </a:endParaRPr>
-          </a:p>
-        </p:txBody>
-      </p:sp>
-      <p:sp>
-        <p:nvSpPr>
-          <p:cNvPr id="29" name="可选流程 28"/>
-          <p:cNvSpPr/>
-          <p:nvPr/>
-        </p:nvSpPr>
-        <p:spPr>
-          <a:xfrm>
-            <a:off x="4271676" y="4014619"/>
-            <a:ext cx="1659412" cy="572325"/>
-          </a:xfrm>
-          <a:prstGeom prst="flowChartAlternateProcess">
-            <a:avLst/>
-          </a:prstGeom>
-          <a:solidFill>
-            <a:srgbClr val="9379B3"/>
-          </a:solidFill>
-        </p:spPr>
-        <p:style>
-          <a:lnRef idx="0">
-            <a:schemeClr val="accent1"/>
-          </a:lnRef>
-          <a:fillRef idx="3">
-            <a:schemeClr val="accent1"/>
-          </a:fillRef>
-          <a:effectRef idx="3">
-            <a:schemeClr val="accent1"/>
-          </a:effectRef>
-          <a:fontRef idx="minor">
-            <a:schemeClr val="lt1"/>
-          </a:fontRef>
-        </p:style>
-        <p:txBody>
-          <a:bodyPr anchor="ctr"/>
-          <a:lstStyle/>
-          <a:p>
-            <a:pPr algn="ctr">
-              <a:defRPr/>
-            </a:pPr>
-            <a:r>
-              <a:rPr kumimoji="1" lang="zh-CN" altLang="en-US" sz="1400" dirty="0" smtClean="0">
-                <a:latin typeface="Heiti SC Light" charset="-122"/>
-                <a:ea typeface="Heiti SC Light" charset="-122"/>
-                <a:cs typeface="Heiti SC Light" charset="-122"/>
-              </a:rPr>
-              <a:t>自动注册</a:t>
-            </a:r>
-          </a:p>
-          <a:p>
-            <a:pPr algn="ctr">
-              <a:defRPr/>
-            </a:pPr>
-            <a:r>
-              <a:rPr kumimoji="1" lang="en-US" altLang="zh-CN" sz="1400" dirty="0" smtClean="0">
-                <a:latin typeface="Heiti SC Light" charset="-122"/>
-                <a:ea typeface="Heiti SC Light" charset="-122"/>
-                <a:cs typeface="Heiti SC Light" charset="-122"/>
-              </a:rPr>
-              <a:t>(</a:t>
-            </a:r>
-            <a:r>
-              <a:rPr kumimoji="1" lang="zh-CN" altLang="en-US" sz="1400" dirty="0">
-                <a:latin typeface="Heiti SC Light" charset="-122"/>
-                <a:ea typeface="Heiti SC Light" charset="-122"/>
-                <a:cs typeface="Heiti SC Light" charset="-122"/>
-              </a:rPr>
-              <a:t>调度中心</a:t>
-            </a:r>
-            <a:r>
-              <a:rPr kumimoji="1" lang="en-US" altLang="zh-CN" sz="1400" dirty="0" smtClean="0">
-                <a:latin typeface="Heiti SC Light" charset="-122"/>
-                <a:ea typeface="Heiti SC Light" charset="-122"/>
-                <a:cs typeface="Heiti SC Light" charset="-122"/>
-              </a:rPr>
-              <a:t>)</a:t>
-            </a:r>
-            <a:endParaRPr kumimoji="1" lang="zh-CN" altLang="en-US" sz="1400" dirty="0">
-              <a:latin typeface="Heiti SC Light" charset="-122"/>
-              <a:ea typeface="Heiti SC Light" charset="-122"/>
-              <a:cs typeface="Heiti SC Light" charset="-122"/>
-            </a:endParaRPr>
-          </a:p>
-        </p:txBody>
-      </p:sp>
-      <p:sp>
-        <p:nvSpPr>
-          <p:cNvPr id="4" name="矩形 3"/>
-          <p:cNvSpPr/>
-          <p:nvPr/>
-        </p:nvSpPr>
-        <p:spPr>
-          <a:xfrm>
-            <a:off x="720867" y="688297"/>
-            <a:ext cx="1672839" cy="1961502"/>
-          </a:xfrm>
-          <a:prstGeom prst="rect">
-            <a:avLst/>
-          </a:prstGeom>
-          <a:solidFill>
-            <a:srgbClr val="E0EBFF"/>
-          </a:solidFill>
-          <a:ln>
-            <a:noFill/>
-          </a:ln>
-        </p:spPr>
-        <p:style>
-          <a:lnRef idx="1">
-            <a:schemeClr val="accent1"/>
-          </a:lnRef>
-          <a:fillRef idx="2">
-            <a:schemeClr val="accent1"/>
-          </a:fillRef>
-          <a:effectRef idx="1">
-            <a:schemeClr val="accent1"/>
-          </a:effectRef>
-          <a:fontRef idx="minor">
-            <a:schemeClr val="dk1"/>
-          </a:fontRef>
-        </p:style>
-        <p:txBody>
-          <a:bodyPr anchor="t"/>
-          <a:lstStyle/>
-          <a:p>
-            <a:pPr algn="ctr">
-              <a:defRPr/>
-            </a:pPr>
-            <a:r>
-              <a:rPr kumimoji="1" lang="zh-CN" altLang="en-US" sz="1400" dirty="0" smtClean="0">
-                <a:latin typeface="Heiti SC Light" charset="-122"/>
-                <a:ea typeface="Heiti SC Light" charset="-122"/>
-                <a:cs typeface="Heiti SC Light" charset="-122"/>
-              </a:rPr>
-              <a:t>任务管理</a:t>
-            </a:r>
-            <a:endParaRPr kumimoji="1" lang="zh-CN" altLang="en-US" sz="1400" dirty="0">
-              <a:latin typeface="Heiti SC Light" charset="-122"/>
-              <a:ea typeface="Heiti SC Light" charset="-122"/>
-              <a:cs typeface="Heiti SC Light" charset="-122"/>
-            </a:endParaRPr>
-          </a:p>
-        </p:txBody>
-      </p:sp>
-      <p:sp>
-        <p:nvSpPr>
-          <p:cNvPr id="5" name="可选流程 4"/>
-          <p:cNvSpPr/>
-          <p:nvPr/>
-        </p:nvSpPr>
-        <p:spPr>
-          <a:xfrm>
-            <a:off x="799893" y="1015627"/>
-            <a:ext cx="1535914" cy="251629"/>
-          </a:xfrm>
-          <a:prstGeom prst="flowChartAlternateProcess">
-            <a:avLst/>
-          </a:prstGeom>
-          <a:solidFill>
-            <a:srgbClr val="6095C9"/>
-          </a:solidFill>
-        </p:spPr>
-        <p:style>
-          <a:lnRef idx="0">
-            <a:schemeClr val="accent1"/>
-          </a:lnRef>
-          <a:fillRef idx="3">
-            <a:schemeClr val="accent1"/>
-          </a:fillRef>
-          <a:effectRef idx="3">
-            <a:schemeClr val="accent1"/>
-          </a:effectRef>
-          <a:fontRef idx="minor">
-            <a:schemeClr val="lt1"/>
-          </a:fontRef>
-        </p:style>
-        <p:txBody>
-          <a:bodyPr anchor="ctr"/>
-          <a:lstStyle/>
-          <a:p>
-            <a:pPr>
-              <a:defRPr/>
-            </a:pPr>
-            <a:r>
-              <a:rPr kumimoji="1" lang="zh-CN" altLang="en-US" sz="1400" dirty="0" smtClean="0">
-                <a:latin typeface="Heiti SC Light" charset="-122"/>
-                <a:ea typeface="Heiti SC Light" charset="-122"/>
-                <a:cs typeface="Heiti SC Light" charset="-122"/>
-              </a:rPr>
-              <a:t>执行器</a:t>
-            </a:r>
-            <a:endParaRPr kumimoji="1" lang="zh-CN" altLang="en-US" sz="1400" dirty="0">
-              <a:latin typeface="Heiti SC Light" charset="-122"/>
-              <a:ea typeface="Heiti SC Light" charset="-122"/>
-              <a:cs typeface="Heiti SC Light" charset="-122"/>
-            </a:endParaRPr>
-          </a:p>
-        </p:txBody>
-      </p:sp>
-      <p:sp>
-        <p:nvSpPr>
-          <p:cNvPr id="60" name="可选流程 59"/>
-          <p:cNvSpPr/>
-          <p:nvPr/>
-        </p:nvSpPr>
-        <p:spPr>
-          <a:xfrm>
-            <a:off x="799893" y="1406309"/>
-            <a:ext cx="1535914" cy="281598"/>
-          </a:xfrm>
-          <a:prstGeom prst="flowChartAlternateProcess">
-            <a:avLst/>
-          </a:prstGeom>
-          <a:solidFill>
-            <a:srgbClr val="6095C9"/>
-          </a:solidFill>
-        </p:spPr>
-        <p:style>
-          <a:lnRef idx="0">
-            <a:schemeClr val="accent1"/>
-          </a:lnRef>
-          <a:fillRef idx="3">
-            <a:schemeClr val="accent1"/>
-          </a:fillRef>
-          <a:effectRef idx="3">
-            <a:schemeClr val="accent1"/>
-          </a:effectRef>
-          <a:fontRef idx="minor">
-            <a:schemeClr val="lt1"/>
-          </a:fontRef>
-        </p:style>
-        <p:txBody>
-          <a:bodyPr anchor="ctr"/>
-          <a:lstStyle/>
-          <a:p>
-            <a:pPr>
-              <a:defRPr/>
-            </a:pPr>
-            <a:r>
-              <a:rPr kumimoji="1" lang="zh-CN" altLang="en-US" sz="1400" dirty="0">
-                <a:latin typeface="Heiti SC Light" charset="-122"/>
-                <a:ea typeface="Heiti SC Light" charset="-122"/>
-                <a:cs typeface="Heiti SC Light" charset="-122"/>
-              </a:rPr>
-              <a:t>任务</a:t>
-            </a:r>
-            <a:r>
-              <a:rPr kumimoji="1" lang="zh-CN" altLang="en-US" sz="1400" dirty="0" smtClean="0">
-                <a:latin typeface="Heiti SC Light" charset="-122"/>
-                <a:ea typeface="Heiti SC Light" charset="-122"/>
-                <a:cs typeface="Heiti SC Light" charset="-122"/>
-              </a:rPr>
-              <a:t>模式</a:t>
-            </a:r>
-            <a:endParaRPr kumimoji="1" lang="zh-CN" altLang="en-US" sz="1400" dirty="0">
-              <a:latin typeface="Heiti SC Light" charset="-122"/>
-              <a:ea typeface="Heiti SC Light" charset="-122"/>
-              <a:cs typeface="Heiti SC Light" charset="-122"/>
-            </a:endParaRPr>
-          </a:p>
-        </p:txBody>
-      </p:sp>
-      <p:sp>
-        <p:nvSpPr>
-          <p:cNvPr id="62" name="可选流程 61"/>
-          <p:cNvSpPr/>
-          <p:nvPr/>
-        </p:nvSpPr>
-        <p:spPr>
-          <a:xfrm>
-            <a:off x="799893" y="1830646"/>
-            <a:ext cx="1535914" cy="255324"/>
-          </a:xfrm>
-          <a:prstGeom prst="flowChartAlternateProcess">
-            <a:avLst/>
-          </a:prstGeom>
-          <a:solidFill>
-            <a:srgbClr val="6095C9"/>
-          </a:solidFill>
-        </p:spPr>
-        <p:style>
-          <a:lnRef idx="0">
-            <a:schemeClr val="accent1"/>
-          </a:lnRef>
-          <a:fillRef idx="3">
-            <a:schemeClr val="accent1"/>
-          </a:fillRef>
-          <a:effectRef idx="3">
-            <a:schemeClr val="accent1"/>
-          </a:effectRef>
-          <a:fontRef idx="minor">
-            <a:schemeClr val="lt1"/>
-          </a:fontRef>
-        </p:style>
-        <p:txBody>
-          <a:bodyPr anchor="ctr"/>
-          <a:lstStyle/>
-          <a:p>
-            <a:pPr>
-              <a:defRPr/>
-            </a:pPr>
-            <a:r>
-              <a:rPr kumimoji="1" lang="en-US" altLang="zh-CN" sz="1400" dirty="0" err="1">
-                <a:latin typeface="Heiti SC Light" charset="-122"/>
-                <a:ea typeface="Heiti SC Light" charset="-122"/>
-                <a:cs typeface="Heiti SC Light" charset="-122"/>
-              </a:rPr>
-              <a:t>JobHandler</a:t>
-            </a:r>
-            <a:endParaRPr kumimoji="1" lang="zh-CN" altLang="en-US" sz="1400" dirty="0">
-              <a:latin typeface="Heiti SC Light" charset="-122"/>
-              <a:ea typeface="Heiti SC Light" charset="-122"/>
-              <a:cs typeface="Heiti SC Light" charset="-122"/>
-            </a:endParaRPr>
-          </a:p>
-        </p:txBody>
-      </p:sp>
-      <p:sp>
-        <p:nvSpPr>
-          <p:cNvPr id="63" name="可选流程 62"/>
-          <p:cNvSpPr/>
-          <p:nvPr/>
-        </p:nvSpPr>
-        <p:spPr>
-          <a:xfrm>
-            <a:off x="799893" y="2206727"/>
-            <a:ext cx="1535914" cy="274201"/>
-          </a:xfrm>
-          <a:prstGeom prst="flowChartAlternateProcess">
-            <a:avLst/>
-          </a:prstGeom>
-          <a:solidFill>
-            <a:srgbClr val="6095C9"/>
-          </a:solidFill>
-        </p:spPr>
-        <p:style>
-          <a:lnRef idx="0">
-            <a:schemeClr val="accent1"/>
-          </a:lnRef>
-          <a:fillRef idx="3">
-            <a:schemeClr val="accent1"/>
-          </a:fillRef>
-          <a:effectRef idx="3">
-            <a:schemeClr val="accent1"/>
-          </a:effectRef>
-          <a:fontRef idx="minor">
-            <a:schemeClr val="lt1"/>
-          </a:fontRef>
-        </p:style>
-        <p:txBody>
-          <a:bodyPr anchor="ctr"/>
-          <a:lstStyle/>
-          <a:p>
-            <a:pPr>
-              <a:defRPr/>
-            </a:pPr>
-            <a:r>
-              <a:rPr kumimoji="1" lang="en-US" altLang="zh-CN" sz="1400" dirty="0" smtClean="0">
-                <a:latin typeface="Heiti SC Light" charset="-122"/>
-                <a:ea typeface="Heiti SC Light" charset="-122"/>
-                <a:cs typeface="Heiti SC Light" charset="-122"/>
-              </a:rPr>
-              <a:t>……</a:t>
-            </a:r>
-            <a:endParaRPr kumimoji="1" lang="zh-CN" altLang="en-US" sz="1400" dirty="0">
-              <a:latin typeface="Heiti SC Light" charset="-122"/>
-              <a:ea typeface="Heiti SC Light" charset="-122"/>
-              <a:cs typeface="Heiti SC Light" charset="-122"/>
-            </a:endParaRPr>
-          </a:p>
-        </p:txBody>
-      </p:sp>
-      <p:sp>
-        <p:nvSpPr>
-          <p:cNvPr id="10" name="矩形 9"/>
-          <p:cNvSpPr/>
-          <p:nvPr/>
-        </p:nvSpPr>
-        <p:spPr>
-          <a:xfrm>
-            <a:off x="2388914" y="688297"/>
-            <a:ext cx="1668047" cy="1961502"/>
-          </a:xfrm>
-          <a:prstGeom prst="rect">
-            <a:avLst/>
-          </a:prstGeom>
-          <a:solidFill>
-            <a:srgbClr val="DEF7FF"/>
-          </a:solidFill>
-          <a:ln>
-            <a:noFill/>
-          </a:ln>
-        </p:spPr>
-        <p:style>
-          <a:lnRef idx="1">
-            <a:schemeClr val="accent1"/>
-          </a:lnRef>
-          <a:fillRef idx="2">
-            <a:schemeClr val="accent1"/>
-          </a:fillRef>
-          <a:effectRef idx="1">
-            <a:schemeClr val="accent1"/>
-          </a:effectRef>
-          <a:fontRef idx="minor">
-            <a:schemeClr val="dk1"/>
-          </a:fontRef>
-        </p:style>
-        <p:txBody>
-          <a:bodyPr anchor="t"/>
-          <a:lstStyle/>
-          <a:p>
-            <a:pPr algn="ctr">
-              <a:defRPr/>
-            </a:pPr>
-            <a:r>
-              <a:rPr kumimoji="1" lang="zh-CN" altLang="en-US" sz="1400" b="1" dirty="0" smtClean="0">
-                <a:latin typeface="Heiti SC Light" charset="-122"/>
-                <a:ea typeface="Heiti SC Light" charset="-122"/>
-                <a:cs typeface="Heiti SC Light" charset="-122"/>
-              </a:rPr>
-              <a:t>执行器管理</a:t>
-            </a:r>
-            <a:endParaRPr kumimoji="1" lang="zh-CN" altLang="en-US" sz="1400" b="1" dirty="0">
-              <a:latin typeface="Heiti SC Light" charset="-122"/>
-              <a:ea typeface="Heiti SC Light" charset="-122"/>
-              <a:cs typeface="Heiti SC Light" charset="-122"/>
-            </a:endParaRPr>
-          </a:p>
-        </p:txBody>
-      </p:sp>
-      <p:sp>
-        <p:nvSpPr>
-          <p:cNvPr id="40" name="可选流程 39"/>
-          <p:cNvSpPr/>
-          <p:nvPr/>
-        </p:nvSpPr>
-        <p:spPr>
-          <a:xfrm>
-            <a:off x="2491980" y="1009669"/>
-            <a:ext cx="1432847" cy="272004"/>
-          </a:xfrm>
-          <a:prstGeom prst="flowChartAlternateProcess">
-            <a:avLst/>
-          </a:prstGeom>
-          <a:solidFill>
-            <a:srgbClr val="4BACC6"/>
-          </a:solidFill>
-        </p:spPr>
-        <p:style>
-          <a:lnRef idx="0">
-            <a:schemeClr val="accent1"/>
-          </a:lnRef>
-          <a:fillRef idx="3">
-            <a:schemeClr val="accent1"/>
-          </a:fillRef>
-          <a:effectRef idx="3">
-            <a:schemeClr val="accent1"/>
-          </a:effectRef>
-          <a:fontRef idx="minor">
-            <a:schemeClr val="lt1"/>
-          </a:fontRef>
-        </p:style>
-        <p:txBody>
-          <a:bodyPr anchor="ctr"/>
-          <a:lstStyle/>
-          <a:p>
-            <a:pPr>
-              <a:defRPr/>
-            </a:pPr>
-            <a:r>
-              <a:rPr kumimoji="1" lang="zh-CN" altLang="en-US" sz="1400" dirty="0" smtClean="0">
-                <a:latin typeface="Heiti SC Light" charset="-122"/>
-                <a:ea typeface="Heiti SC Light" charset="-122"/>
-                <a:cs typeface="Heiti SC Light" charset="-122"/>
-              </a:rPr>
-              <a:t>注册方式</a:t>
-            </a:r>
-            <a:endParaRPr kumimoji="1" lang="zh-CN" altLang="en-US" sz="1400" dirty="0">
-              <a:latin typeface="Heiti SC Light" charset="-122"/>
-              <a:ea typeface="Heiti SC Light" charset="-122"/>
-              <a:cs typeface="Heiti SC Light" charset="-122"/>
-            </a:endParaRPr>
-          </a:p>
-        </p:txBody>
-      </p:sp>
-      <p:sp>
-        <p:nvSpPr>
-          <p:cNvPr id="66" name="可选流程 65"/>
-          <p:cNvSpPr/>
-          <p:nvPr/>
-        </p:nvSpPr>
-        <p:spPr>
-          <a:xfrm>
-            <a:off x="2491979" y="1400460"/>
-            <a:ext cx="1432847" cy="275832"/>
-          </a:xfrm>
-          <a:prstGeom prst="flowChartAlternateProcess">
-            <a:avLst/>
-          </a:prstGeom>
-          <a:solidFill>
-            <a:srgbClr val="4BACC6"/>
-          </a:solidFill>
-        </p:spPr>
-        <p:style>
-          <a:lnRef idx="0">
-            <a:schemeClr val="accent1"/>
-          </a:lnRef>
-          <a:fillRef idx="3">
-            <a:schemeClr val="accent1"/>
-          </a:fillRef>
-          <a:effectRef idx="3">
-            <a:schemeClr val="accent1"/>
-          </a:effectRef>
-          <a:fontRef idx="minor">
-            <a:schemeClr val="lt1"/>
-          </a:fontRef>
-        </p:style>
-        <p:txBody>
-          <a:bodyPr anchor="ctr"/>
-          <a:lstStyle/>
-          <a:p>
-            <a:pPr>
-              <a:defRPr/>
-            </a:pPr>
-            <a:r>
-              <a:rPr kumimoji="1" lang="en-US" altLang="zh-CN" sz="1400" dirty="0" err="1" smtClean="0">
-                <a:latin typeface="Heiti SC Light" charset="-122"/>
-                <a:ea typeface="Heiti SC Light" charset="-122"/>
-                <a:cs typeface="Heiti SC Light" charset="-122"/>
-              </a:rPr>
-              <a:t>AppName</a:t>
-            </a:r>
-            <a:endParaRPr kumimoji="1" lang="zh-CN" altLang="en-US" sz="1400" dirty="0">
-              <a:latin typeface="Heiti SC Light" charset="-122"/>
-              <a:ea typeface="Heiti SC Light" charset="-122"/>
-              <a:cs typeface="Heiti SC Light" charset="-122"/>
-            </a:endParaRPr>
-          </a:p>
-        </p:txBody>
-      </p:sp>
-      <p:sp>
-        <p:nvSpPr>
-          <p:cNvPr id="67" name="可选流程 66"/>
-          <p:cNvSpPr/>
-          <p:nvPr/>
-        </p:nvSpPr>
-        <p:spPr>
-          <a:xfrm>
-            <a:off x="2491978" y="1834820"/>
-            <a:ext cx="1432847" cy="263850"/>
-          </a:xfrm>
-          <a:prstGeom prst="flowChartAlternateProcess">
-            <a:avLst/>
-          </a:prstGeom>
-          <a:solidFill>
-            <a:srgbClr val="4BACC6"/>
-          </a:solidFill>
-        </p:spPr>
-        <p:style>
-          <a:lnRef idx="0">
-            <a:schemeClr val="accent1"/>
-          </a:lnRef>
-          <a:fillRef idx="3">
-            <a:schemeClr val="accent1"/>
-          </a:fillRef>
-          <a:effectRef idx="3">
-            <a:schemeClr val="accent1"/>
-          </a:effectRef>
-          <a:fontRef idx="minor">
-            <a:schemeClr val="lt1"/>
-          </a:fontRef>
-        </p:style>
-        <p:txBody>
-          <a:bodyPr anchor="ctr"/>
-          <a:lstStyle/>
-          <a:p>
-            <a:pPr>
-              <a:defRPr/>
-            </a:pPr>
-            <a:r>
-              <a:rPr kumimoji="1" lang="zh-CN" altLang="en-US" sz="1400" dirty="0" smtClean="0">
-                <a:latin typeface="Heiti SC Light" charset="-122"/>
-                <a:ea typeface="Heiti SC Light" charset="-122"/>
-                <a:cs typeface="Heiti SC Light" charset="-122"/>
-              </a:rPr>
-              <a:t>机器地址列表</a:t>
-            </a:r>
-            <a:endParaRPr kumimoji="1" lang="zh-CN" altLang="en-US" sz="1400" dirty="0">
-              <a:latin typeface="Heiti SC Light" charset="-122"/>
-              <a:ea typeface="Heiti SC Light" charset="-122"/>
-              <a:cs typeface="Heiti SC Light" charset="-122"/>
-            </a:endParaRPr>
-          </a:p>
-        </p:txBody>
-      </p:sp>
-      <p:sp>
-        <p:nvSpPr>
-          <p:cNvPr id="68" name="可选流程 67"/>
-          <p:cNvSpPr/>
-          <p:nvPr/>
-        </p:nvSpPr>
-        <p:spPr>
-          <a:xfrm>
-            <a:off x="2491977" y="2217078"/>
-            <a:ext cx="1432847" cy="263850"/>
-          </a:xfrm>
-          <a:prstGeom prst="flowChartAlternateProcess">
-            <a:avLst/>
-          </a:prstGeom>
-          <a:solidFill>
-            <a:srgbClr val="4BACC6"/>
-          </a:solidFill>
-        </p:spPr>
-        <p:style>
-          <a:lnRef idx="0">
-            <a:schemeClr val="accent1"/>
-          </a:lnRef>
-          <a:fillRef idx="3">
-            <a:schemeClr val="accent1"/>
-          </a:fillRef>
-          <a:effectRef idx="3">
-            <a:schemeClr val="accent1"/>
-          </a:effectRef>
-          <a:fontRef idx="minor">
-            <a:schemeClr val="lt1"/>
-          </a:fontRef>
-        </p:style>
-        <p:txBody>
-          <a:bodyPr anchor="ctr"/>
-          <a:lstStyle/>
-          <a:p>
-            <a:pPr>
-              <a:defRPr/>
-            </a:pPr>
-            <a:r>
-              <a:rPr kumimoji="1" lang="en-US" altLang="zh-CN" sz="1400" dirty="0" smtClean="0">
-                <a:latin typeface="Heiti SC Light" charset="-122"/>
-                <a:ea typeface="Heiti SC Light" charset="-122"/>
-                <a:cs typeface="Heiti SC Light" charset="-122"/>
-              </a:rPr>
-              <a:t>……</a:t>
-            </a:r>
-            <a:endParaRPr kumimoji="1" lang="zh-CN" altLang="en-US" sz="1400" dirty="0">
-              <a:latin typeface="Heiti SC Light" charset="-122"/>
-              <a:ea typeface="Heiti SC Light" charset="-122"/>
-              <a:cs typeface="Heiti SC Light" charset="-122"/>
-            </a:endParaRPr>
-          </a:p>
-        </p:txBody>
-      </p:sp>
-      <p:cxnSp>
-        <p:nvCxnSpPr>
-          <p:cNvPr id="86" name="直线箭头连接符 85"/>
-          <p:cNvCxnSpPr/>
-          <p:nvPr/>
-        </p:nvCxnSpPr>
-        <p:spPr>
-          <a:xfrm>
-            <a:off x="11955553" y="7258143"/>
-            <a:ext cx="9228" cy="410923"/>
-          </a:xfrm>
-          <a:prstGeom prst="straightConnector1">
-            <a:avLst/>
-          </a:prstGeom>
-          <a:ln w="28575">
-            <a:prstDash val="dash"/>
-            <a:headEnd type="none" w="med" len="med"/>
-            <a:tailEnd type="arrow" w="med" len="med"/>
-          </a:ln>
-        </p:spPr>
-        <p:style>
-          <a:lnRef idx="1">
-            <a:schemeClr val="accent1"/>
-          </a:lnRef>
-          <a:fillRef idx="0">
-            <a:schemeClr val="accent1"/>
-          </a:fillRef>
-          <a:effectRef idx="0">
-            <a:schemeClr val="accent1"/>
-          </a:effectRef>
-          <a:fontRef idx="minor">
-            <a:schemeClr val="tx1"/>
-          </a:fontRef>
-        </p:style>
-      </p:cxnSp>
-      <p:cxnSp>
-        <p:nvCxnSpPr>
-          <p:cNvPr id="87" name="直线箭头连接符 86"/>
-          <p:cNvCxnSpPr/>
-          <p:nvPr/>
-        </p:nvCxnSpPr>
-        <p:spPr>
-          <a:xfrm flipV="1">
-            <a:off x="12192000" y="7245443"/>
-            <a:ext cx="0" cy="417180"/>
-          </a:xfrm>
-          <a:prstGeom prst="straightConnector1">
-            <a:avLst/>
-          </a:prstGeom>
-          <a:ln w="28575">
-            <a:prstDash val="dash"/>
-            <a:headEnd type="none" w="med" len="med"/>
-            <a:tailEnd type="arrow" w="med" len="med"/>
-          </a:ln>
-        </p:spPr>
-        <p:style>
-          <a:lnRef idx="1">
-            <a:schemeClr val="accent1"/>
-          </a:lnRef>
-          <a:fillRef idx="0">
-            <a:schemeClr val="accent1"/>
-          </a:fillRef>
-          <a:effectRef idx="0">
-            <a:schemeClr val="accent1"/>
-          </a:effectRef>
-          <a:fontRef idx="minor">
-            <a:schemeClr val="tx1"/>
-          </a:fontRef>
-        </p:style>
-      </p:cxnSp>
-      <p:sp>
-        <p:nvSpPr>
-          <p:cNvPr id="101" name="矩形 100"/>
-          <p:cNvSpPr/>
-          <p:nvPr/>
-        </p:nvSpPr>
-        <p:spPr>
-          <a:xfrm>
-            <a:off x="6400801" y="576164"/>
-            <a:ext cx="5181600" cy="4592736"/>
-          </a:xfrm>
-          <a:prstGeom prst="rect">
-            <a:avLst/>
-          </a:prstGeom>
-          <a:ln>
-            <a:noFill/>
-          </a:ln>
-        </p:spPr>
-        <p:style>
-          <a:lnRef idx="1">
-            <a:schemeClr val="accent6"/>
-          </a:lnRef>
-          <a:fillRef idx="2">
-            <a:schemeClr val="accent6"/>
-          </a:fillRef>
-          <a:effectRef idx="1">
-            <a:schemeClr val="accent6"/>
-          </a:effectRef>
-          <a:fontRef idx="minor">
-            <a:schemeClr val="dk1"/>
-          </a:fontRef>
-        </p:style>
-        <p:txBody>
-          <a:bodyPr anchor="b"/>
-          <a:lstStyle/>
-          <a:p>
-            <a:pPr algn="ctr">
-              <a:defRPr/>
-            </a:pPr>
-            <a:r>
-              <a:rPr kumimoji="1" lang="zh-CN" altLang="en-US" sz="1600" b="1" dirty="0" smtClean="0">
-                <a:latin typeface="Heiti SC Light" charset="-122"/>
-                <a:ea typeface="Heiti SC Light" charset="-122"/>
-                <a:cs typeface="Heiti SC Light" charset="-122"/>
-              </a:rPr>
-              <a:t>执行器</a:t>
-            </a:r>
-            <a:endParaRPr kumimoji="1" lang="zh-CN" altLang="en-US" sz="1600" b="1" dirty="0">
-              <a:latin typeface="Heiti SC Light" charset="-122"/>
-              <a:ea typeface="Heiti SC Light" charset="-122"/>
-              <a:cs typeface="Heiti SC Light" charset="-122"/>
-            </a:endParaRPr>
-          </a:p>
-        </p:txBody>
-      </p:sp>
-      <p:cxnSp>
-        <p:nvCxnSpPr>
-          <p:cNvPr id="133" name="直线箭头连接符 132"/>
-          <p:cNvCxnSpPr/>
-          <p:nvPr/>
-        </p:nvCxnSpPr>
-        <p:spPr>
-          <a:xfrm>
-            <a:off x="12476487" y="7419060"/>
-            <a:ext cx="413345" cy="1"/>
-          </a:xfrm>
-          <a:prstGeom prst="straightConnector1">
-            <a:avLst/>
-          </a:prstGeom>
-          <a:ln w="28575">
-            <a:prstDash val="dash"/>
-            <a:headEnd type="none" w="med" len="med"/>
-            <a:tailEnd type="arrow" w="med" len="med"/>
-          </a:ln>
-        </p:spPr>
-        <p:style>
-          <a:lnRef idx="1">
-            <a:schemeClr val="accent1"/>
-          </a:lnRef>
-          <a:fillRef idx="0">
-            <a:schemeClr val="accent1"/>
-          </a:fillRef>
-          <a:effectRef idx="0">
-            <a:schemeClr val="accent1"/>
-          </a:effectRef>
-          <a:fontRef idx="minor">
-            <a:schemeClr val="tx1"/>
-          </a:fontRef>
-        </p:style>
-      </p:cxnSp>
-      <p:cxnSp>
-        <p:nvCxnSpPr>
-          <p:cNvPr id="134" name="直线箭头连接符 133"/>
-          <p:cNvCxnSpPr/>
-          <p:nvPr/>
-        </p:nvCxnSpPr>
-        <p:spPr>
-          <a:xfrm flipH="1">
-            <a:off x="12434527" y="7662622"/>
-            <a:ext cx="429217" cy="1"/>
-          </a:xfrm>
-          <a:prstGeom prst="straightConnector1">
-            <a:avLst/>
-          </a:prstGeom>
-          <a:ln w="28575">
-            <a:prstDash val="dash"/>
-            <a:headEnd type="none" w="med" len="med"/>
-            <a:tailEnd type="arrow" w="med" len="med"/>
-          </a:ln>
-        </p:spPr>
-        <p:style>
-          <a:lnRef idx="1">
-            <a:schemeClr val="accent1"/>
-          </a:lnRef>
-          <a:fillRef idx="0">
-            <a:schemeClr val="accent1"/>
-          </a:fillRef>
-          <a:effectRef idx="0">
-            <a:schemeClr val="accent1"/>
-          </a:effectRef>
-          <a:fontRef idx="minor">
-            <a:schemeClr val="tx1"/>
-          </a:fontRef>
-        </p:style>
-      </p:cxnSp>
-      <p:sp>
-        <p:nvSpPr>
-          <p:cNvPr id="3" name="圆角矩形 2"/>
-          <p:cNvSpPr/>
-          <p:nvPr/>
-        </p:nvSpPr>
-        <p:spPr>
-          <a:xfrm>
-            <a:off x="4275163" y="870785"/>
-            <a:ext cx="1655926" cy="586589"/>
-          </a:xfrm>
-          <a:prstGeom prst="roundRect">
-            <a:avLst/>
-          </a:prstGeom>
-        </p:spPr>
-        <p:style>
-          <a:lnRef idx="0">
-            <a:schemeClr val="accent2"/>
-          </a:lnRef>
-          <a:fillRef idx="3">
-            <a:schemeClr val="accent2"/>
-          </a:fillRef>
-          <a:effectRef idx="3">
-            <a:schemeClr val="accent2"/>
-          </a:effectRef>
-          <a:fontRef idx="minor">
-            <a:schemeClr val="lt1"/>
-          </a:fontRef>
-        </p:style>
-        <p:txBody>
-          <a:bodyPr anchor="ctr"/>
-          <a:lstStyle/>
-          <a:p>
-            <a:pPr algn="ctr">
-              <a:defRPr/>
-            </a:pPr>
-            <a:r>
-              <a:rPr kumimoji="1" lang="zh-CN" altLang="en-US" sz="1400" dirty="0" smtClean="0">
-                <a:latin typeface="Heiti SC Light" charset="-122"/>
-                <a:ea typeface="Heiti SC Light" charset="-122"/>
-                <a:cs typeface="Heiti SC Light" charset="-122"/>
-              </a:rPr>
-              <a:t>调度器</a:t>
-            </a:r>
-          </a:p>
-          <a:p>
-            <a:pPr algn="ctr">
-              <a:defRPr/>
-            </a:pPr>
-            <a:r>
-              <a:rPr kumimoji="1" lang="en-US" altLang="zh-CN" sz="1400" dirty="0" smtClean="0">
-                <a:latin typeface="Heiti SC Light" charset="-122"/>
-                <a:ea typeface="Heiti SC Light" charset="-122"/>
-                <a:cs typeface="Heiti SC Light" charset="-122"/>
-              </a:rPr>
-              <a:t>(quartz)</a:t>
-            </a:r>
-            <a:endParaRPr kumimoji="1" lang="zh-CN" altLang="en-US" sz="1400" dirty="0">
-              <a:latin typeface="Heiti SC Light" charset="-122"/>
-              <a:ea typeface="Heiti SC Light" charset="-122"/>
-              <a:cs typeface="Heiti SC Light" charset="-122"/>
-            </a:endParaRPr>
-          </a:p>
-        </p:txBody>
-      </p:sp>
-      <p:sp>
-        <p:nvSpPr>
-          <p:cNvPr id="74" name="圆角矩形 73"/>
-          <p:cNvSpPr/>
-          <p:nvPr/>
-        </p:nvSpPr>
-        <p:spPr>
-          <a:xfrm>
-            <a:off x="4275906" y="2893988"/>
-            <a:ext cx="1655182" cy="585805"/>
-          </a:xfrm>
-          <a:prstGeom prst="roundRect">
-            <a:avLst/>
-          </a:prstGeom>
-          <a:solidFill>
-            <a:srgbClr val="58B8D1"/>
-          </a:solidFill>
-        </p:spPr>
-        <p:style>
-          <a:lnRef idx="0">
-            <a:schemeClr val="accent1"/>
-          </a:lnRef>
-          <a:fillRef idx="3">
-            <a:schemeClr val="accent1"/>
-          </a:fillRef>
-          <a:effectRef idx="3">
-            <a:schemeClr val="accent1"/>
-          </a:effectRef>
-          <a:fontRef idx="minor">
-            <a:schemeClr val="lt1"/>
-          </a:fontRef>
-        </p:style>
-        <p:txBody>
-          <a:bodyPr anchor="ctr"/>
-          <a:lstStyle/>
-          <a:p>
-            <a:pPr algn="ctr">
-              <a:defRPr/>
-            </a:pPr>
-            <a:r>
-              <a:rPr kumimoji="1" lang="en-US" altLang="zh-CN" sz="1400" dirty="0">
-                <a:latin typeface="Heiti SC Light" charset="-122"/>
-                <a:ea typeface="Heiti SC Light" charset="-122"/>
-                <a:cs typeface="Heiti SC Light" charset="-122"/>
-              </a:rPr>
-              <a:t>Rolling</a:t>
-            </a:r>
-            <a:r>
-              <a:rPr kumimoji="1" lang="zh-CN" altLang="en-US" sz="1400" dirty="0" smtClean="0">
-                <a:latin typeface="Heiti SC Light" charset="-122"/>
-                <a:ea typeface="Heiti SC Light" charset="-122"/>
-                <a:cs typeface="Heiti SC Light" charset="-122"/>
-              </a:rPr>
-              <a:t>日志</a:t>
-            </a:r>
-          </a:p>
-          <a:p>
-            <a:pPr algn="ctr">
-              <a:defRPr/>
-            </a:pPr>
-            <a:r>
-              <a:rPr kumimoji="1" lang="en-US" altLang="zh-CN" sz="1400" dirty="0" smtClean="0">
-                <a:latin typeface="Heiti SC Light" charset="-122"/>
-                <a:ea typeface="Heiti SC Light" charset="-122"/>
-                <a:cs typeface="Heiti SC Light" charset="-122"/>
-              </a:rPr>
-              <a:t>(</a:t>
-            </a:r>
-            <a:r>
-              <a:rPr kumimoji="1" lang="zh-CN" altLang="en-US" sz="1400" dirty="0" smtClean="0">
-                <a:latin typeface="Heiti SC Light" charset="-122"/>
-                <a:ea typeface="Heiti SC Light" charset="-122"/>
-                <a:cs typeface="Heiti SC Light" charset="-122"/>
-              </a:rPr>
-              <a:t>实时</a:t>
-            </a:r>
-            <a:r>
-              <a:rPr kumimoji="1" lang="en-US" altLang="zh-CN" sz="1400" dirty="0" smtClean="0">
-                <a:latin typeface="Heiti SC Light" charset="-122"/>
-                <a:ea typeface="Heiti SC Light" charset="-122"/>
-                <a:cs typeface="Heiti SC Light" charset="-122"/>
-              </a:rPr>
-              <a:t>)</a:t>
-            </a:r>
-            <a:endParaRPr kumimoji="1" lang="zh-CN" altLang="en-US" sz="1400" dirty="0">
-              <a:latin typeface="Heiti SC Light" charset="-122"/>
-              <a:ea typeface="Heiti SC Light" charset="-122"/>
-              <a:cs typeface="Heiti SC Light" charset="-122"/>
-            </a:endParaRPr>
-          </a:p>
-        </p:txBody>
-      </p:sp>
-      <p:sp>
-        <p:nvSpPr>
-          <p:cNvPr id="139" name="圆角矩形 138"/>
-          <p:cNvSpPr/>
-          <p:nvPr/>
-        </p:nvSpPr>
-        <p:spPr>
-          <a:xfrm>
-            <a:off x="4271675" y="1887699"/>
-            <a:ext cx="1659413" cy="574484"/>
-          </a:xfrm>
-          <a:prstGeom prst="roundRect">
-            <a:avLst/>
-          </a:prstGeom>
-          <a:solidFill>
-            <a:srgbClr val="58B8D1"/>
-          </a:solidFill>
-        </p:spPr>
-        <p:style>
-          <a:lnRef idx="0">
-            <a:schemeClr val="accent1"/>
-          </a:lnRef>
-          <a:fillRef idx="3">
-            <a:schemeClr val="accent1"/>
-          </a:fillRef>
-          <a:effectRef idx="3">
-            <a:schemeClr val="accent1"/>
-          </a:effectRef>
-          <a:fontRef idx="minor">
-            <a:schemeClr val="lt1"/>
-          </a:fontRef>
-        </p:style>
-        <p:txBody>
-          <a:bodyPr anchor="ctr"/>
-          <a:lstStyle/>
-          <a:p>
-            <a:pPr algn="ctr">
-              <a:defRPr/>
-            </a:pPr>
-            <a:r>
-              <a:rPr kumimoji="1" lang="zh-CN" altLang="en-US" sz="1400" dirty="0">
-                <a:latin typeface="Heiti SC Light" charset="-122"/>
-                <a:ea typeface="Heiti SC Light" charset="-122"/>
-                <a:cs typeface="Heiti SC Light" charset="-122"/>
-              </a:rPr>
-              <a:t>回调</a:t>
-            </a:r>
-            <a:r>
-              <a:rPr kumimoji="1" lang="zh-CN" altLang="en-US" sz="1400" dirty="0" smtClean="0">
-                <a:latin typeface="Heiti SC Light" charset="-122"/>
-                <a:ea typeface="Heiti SC Light" charset="-122"/>
-                <a:cs typeface="Heiti SC Light" charset="-122"/>
-              </a:rPr>
-              <a:t>服务</a:t>
-            </a:r>
-          </a:p>
-          <a:p>
-            <a:pPr algn="ctr">
-              <a:defRPr/>
-            </a:pPr>
-            <a:r>
-              <a:rPr kumimoji="1" lang="en-US" altLang="zh-CN" sz="1400" dirty="0" smtClean="0">
-                <a:latin typeface="Heiti SC Light" charset="-122"/>
-                <a:ea typeface="Heiti SC Light" charset="-122"/>
-                <a:cs typeface="Heiti SC Light" charset="-122"/>
-              </a:rPr>
-              <a:t>(</a:t>
-            </a:r>
-            <a:r>
-              <a:rPr kumimoji="1" lang="en-US" altLang="zh-CN" sz="1400" dirty="0">
-                <a:latin typeface="Heiti SC Light" charset="-122"/>
-                <a:ea typeface="Heiti SC Light" charset="-122"/>
-                <a:cs typeface="Heiti SC Light" charset="-122"/>
-              </a:rPr>
-              <a:t>jetty)</a:t>
-            </a:r>
-            <a:endParaRPr kumimoji="1" lang="zh-CN" altLang="en-US" sz="1400" dirty="0">
-              <a:latin typeface="Heiti SC Light" charset="-122"/>
-              <a:ea typeface="Heiti SC Light" charset="-122"/>
-              <a:cs typeface="Heiti SC Light" charset="-122"/>
-            </a:endParaRPr>
-          </a:p>
-        </p:txBody>
-      </p:sp>
-      <p:sp>
-        <p:nvSpPr>
-          <p:cNvPr id="153" name="矩形 152"/>
-          <p:cNvSpPr/>
-          <p:nvPr/>
-        </p:nvSpPr>
-        <p:spPr>
-          <a:xfrm>
-            <a:off x="720867" y="2657780"/>
-            <a:ext cx="1668047" cy="1961502"/>
-          </a:xfrm>
-          <a:prstGeom prst="rect">
-            <a:avLst/>
-          </a:prstGeom>
-          <a:solidFill>
-            <a:srgbClr val="DEF7FF"/>
-          </a:solidFill>
-          <a:ln>
-            <a:noFill/>
-          </a:ln>
-        </p:spPr>
-        <p:style>
-          <a:lnRef idx="1">
-            <a:schemeClr val="accent1"/>
-          </a:lnRef>
-          <a:fillRef idx="2">
-            <a:schemeClr val="accent1"/>
-          </a:fillRef>
-          <a:effectRef idx="1">
-            <a:schemeClr val="accent1"/>
-          </a:effectRef>
-          <a:fontRef idx="minor">
-            <a:schemeClr val="dk1"/>
-          </a:fontRef>
-        </p:style>
-        <p:txBody>
-          <a:bodyPr anchor="t"/>
-          <a:lstStyle/>
-          <a:p>
-            <a:pPr algn="ctr">
-              <a:defRPr/>
-            </a:pPr>
-            <a:r>
-              <a:rPr kumimoji="1" lang="zh-CN" altLang="en-US" sz="1400" b="1" dirty="0">
-                <a:latin typeface="Heiti SC Light" charset="-122"/>
-                <a:ea typeface="Heiti SC Light" charset="-122"/>
-                <a:cs typeface="Heiti SC Light" charset="-122"/>
-              </a:rPr>
-              <a:t>日志管理</a:t>
-            </a:r>
-          </a:p>
-        </p:txBody>
-      </p:sp>
-      <p:sp>
-        <p:nvSpPr>
-          <p:cNvPr id="154" name="可选流程 153"/>
-          <p:cNvSpPr/>
-          <p:nvPr/>
-        </p:nvSpPr>
-        <p:spPr>
-          <a:xfrm>
-            <a:off x="823933" y="2979152"/>
-            <a:ext cx="1432847" cy="272004"/>
-          </a:xfrm>
-          <a:prstGeom prst="flowChartAlternateProcess">
-            <a:avLst/>
-          </a:prstGeom>
-          <a:solidFill>
-            <a:srgbClr val="4BACC6"/>
-          </a:solidFill>
-        </p:spPr>
-        <p:style>
-          <a:lnRef idx="0">
-            <a:schemeClr val="accent1"/>
-          </a:lnRef>
-          <a:fillRef idx="3">
-            <a:schemeClr val="accent1"/>
-          </a:fillRef>
-          <a:effectRef idx="3">
-            <a:schemeClr val="accent1"/>
-          </a:effectRef>
-          <a:fontRef idx="minor">
-            <a:schemeClr val="lt1"/>
-          </a:fontRef>
-        </p:style>
-        <p:txBody>
-          <a:bodyPr anchor="ctr"/>
-          <a:lstStyle/>
-          <a:p>
-            <a:pPr>
-              <a:defRPr/>
-            </a:pPr>
-            <a:r>
-              <a:rPr kumimoji="1" lang="zh-CN" altLang="en-US" sz="1400" dirty="0">
-                <a:latin typeface="Heiti SC Light" charset="-122"/>
-                <a:ea typeface="Heiti SC Light" charset="-122"/>
-                <a:cs typeface="Heiti SC Light" charset="-122"/>
-              </a:rPr>
-              <a:t>调度日志</a:t>
-            </a:r>
-          </a:p>
-        </p:txBody>
-      </p:sp>
-      <p:sp>
-        <p:nvSpPr>
-          <p:cNvPr id="155" name="可选流程 154"/>
-          <p:cNvSpPr/>
-          <p:nvPr/>
-        </p:nvSpPr>
-        <p:spPr>
-          <a:xfrm>
-            <a:off x="823932" y="3369943"/>
-            <a:ext cx="1432847" cy="275832"/>
-          </a:xfrm>
-          <a:prstGeom prst="flowChartAlternateProcess">
-            <a:avLst/>
-          </a:prstGeom>
-          <a:solidFill>
-            <a:srgbClr val="4BACC6"/>
-          </a:solidFill>
-        </p:spPr>
-        <p:style>
-          <a:lnRef idx="0">
-            <a:schemeClr val="accent1"/>
-          </a:lnRef>
-          <a:fillRef idx="3">
-            <a:schemeClr val="accent1"/>
-          </a:fillRef>
-          <a:effectRef idx="3">
-            <a:schemeClr val="accent1"/>
-          </a:effectRef>
-          <a:fontRef idx="minor">
-            <a:schemeClr val="lt1"/>
-          </a:fontRef>
-        </p:style>
-        <p:txBody>
-          <a:bodyPr anchor="ctr"/>
-          <a:lstStyle/>
-          <a:p>
-            <a:pPr>
-              <a:defRPr/>
-            </a:pPr>
-            <a:r>
-              <a:rPr kumimoji="1" lang="en-US" altLang="zh-CN" sz="1400" dirty="0">
-                <a:latin typeface="Heiti SC Light" charset="-122"/>
-                <a:ea typeface="Heiti SC Light" charset="-122"/>
-                <a:cs typeface="Heiti SC Light" charset="-122"/>
-              </a:rPr>
-              <a:t>Rolling</a:t>
-            </a:r>
-            <a:r>
-              <a:rPr kumimoji="1" lang="zh-CN" altLang="en-US" sz="1400" dirty="0">
-                <a:latin typeface="Heiti SC Light" charset="-122"/>
-                <a:ea typeface="Heiti SC Light" charset="-122"/>
-                <a:cs typeface="Heiti SC Light" charset="-122"/>
-              </a:rPr>
-              <a:t>日志</a:t>
-            </a:r>
-          </a:p>
-        </p:txBody>
-      </p:sp>
-      <p:sp>
-        <p:nvSpPr>
-          <p:cNvPr id="156" name="可选流程 155"/>
-          <p:cNvSpPr/>
-          <p:nvPr/>
-        </p:nvSpPr>
-        <p:spPr>
-          <a:xfrm>
-            <a:off x="823931" y="3804303"/>
-            <a:ext cx="1432847" cy="263850"/>
-          </a:xfrm>
-          <a:prstGeom prst="flowChartAlternateProcess">
-            <a:avLst/>
-          </a:prstGeom>
-          <a:solidFill>
-            <a:srgbClr val="4BACC6"/>
-          </a:solidFill>
-        </p:spPr>
-        <p:style>
-          <a:lnRef idx="0">
-            <a:schemeClr val="accent1"/>
-          </a:lnRef>
-          <a:fillRef idx="3">
-            <a:schemeClr val="accent1"/>
-          </a:fillRef>
-          <a:effectRef idx="3">
-            <a:schemeClr val="accent1"/>
-          </a:effectRef>
-          <a:fontRef idx="minor">
-            <a:schemeClr val="lt1"/>
-          </a:fontRef>
-        </p:style>
-        <p:txBody>
-          <a:bodyPr anchor="ctr"/>
-          <a:lstStyle/>
-          <a:p>
-            <a:pPr>
-              <a:defRPr/>
-            </a:pPr>
-            <a:r>
-              <a:rPr kumimoji="1" lang="en-US" altLang="zh-CN" sz="1400" dirty="0">
-                <a:latin typeface="Heiti SC Light" charset="-122"/>
-                <a:ea typeface="Heiti SC Light" charset="-122"/>
-                <a:cs typeface="Heiti SC Light" charset="-122"/>
-              </a:rPr>
-              <a:t>GLUE</a:t>
-            </a:r>
-            <a:r>
-              <a:rPr kumimoji="1" lang="zh-CN" altLang="en-US" sz="1400" dirty="0">
-                <a:latin typeface="Heiti SC Light" charset="-122"/>
-                <a:ea typeface="Heiti SC Light" charset="-122"/>
-                <a:cs typeface="Heiti SC Light" charset="-122"/>
-              </a:rPr>
-              <a:t>版本日志</a:t>
-            </a:r>
-          </a:p>
-        </p:txBody>
-      </p:sp>
-      <p:sp>
-        <p:nvSpPr>
-          <p:cNvPr id="157" name="可选流程 156"/>
-          <p:cNvSpPr/>
-          <p:nvPr/>
-        </p:nvSpPr>
-        <p:spPr>
-          <a:xfrm>
-            <a:off x="823930" y="4186561"/>
-            <a:ext cx="1432847" cy="263850"/>
-          </a:xfrm>
-          <a:prstGeom prst="flowChartAlternateProcess">
-            <a:avLst/>
-          </a:prstGeom>
-          <a:solidFill>
-            <a:srgbClr val="4BACC6"/>
-          </a:solidFill>
-        </p:spPr>
-        <p:style>
-          <a:lnRef idx="0">
-            <a:schemeClr val="accent1"/>
-          </a:lnRef>
-          <a:fillRef idx="3">
-            <a:schemeClr val="accent1"/>
-          </a:fillRef>
-          <a:effectRef idx="3">
-            <a:schemeClr val="accent1"/>
-          </a:effectRef>
-          <a:fontRef idx="minor">
-            <a:schemeClr val="lt1"/>
-          </a:fontRef>
-        </p:style>
-        <p:txBody>
-          <a:bodyPr anchor="ctr"/>
-          <a:lstStyle/>
-          <a:p>
-            <a:pPr>
-              <a:defRPr/>
-            </a:pPr>
-            <a:r>
-              <a:rPr kumimoji="1" lang="en-US" altLang="zh-CN" sz="1400" dirty="0" smtClean="0">
-                <a:latin typeface="Heiti SC Light" charset="-122"/>
-                <a:ea typeface="Heiti SC Light" charset="-122"/>
-                <a:cs typeface="Heiti SC Light" charset="-122"/>
-              </a:rPr>
-              <a:t>……</a:t>
-            </a:r>
-            <a:endParaRPr kumimoji="1" lang="zh-CN" altLang="en-US" sz="1400" dirty="0">
-              <a:latin typeface="Heiti SC Light" charset="-122"/>
-              <a:ea typeface="Heiti SC Light" charset="-122"/>
-              <a:cs typeface="Heiti SC Light" charset="-122"/>
-            </a:endParaRPr>
-          </a:p>
-        </p:txBody>
-      </p:sp>
-      <p:sp>
-        <p:nvSpPr>
-          <p:cNvPr id="158" name="矩形 157"/>
-          <p:cNvSpPr/>
-          <p:nvPr/>
-        </p:nvSpPr>
-        <p:spPr>
-          <a:xfrm>
-            <a:off x="2384122" y="2645252"/>
-            <a:ext cx="1672839" cy="1974030"/>
-          </a:xfrm>
-          <a:prstGeom prst="rect">
-            <a:avLst/>
-          </a:prstGeom>
-          <a:solidFill>
-            <a:srgbClr val="E0EBFF"/>
-          </a:solidFill>
-          <a:ln>
-            <a:noFill/>
-          </a:ln>
-        </p:spPr>
-        <p:style>
-          <a:lnRef idx="1">
-            <a:schemeClr val="accent1"/>
-          </a:lnRef>
-          <a:fillRef idx="2">
-            <a:schemeClr val="accent1"/>
-          </a:fillRef>
-          <a:effectRef idx="1">
-            <a:schemeClr val="accent1"/>
-          </a:effectRef>
-          <a:fontRef idx="minor">
-            <a:schemeClr val="dk1"/>
-          </a:fontRef>
-        </p:style>
-        <p:txBody>
-          <a:bodyPr anchor="t"/>
-          <a:lstStyle/>
-          <a:p>
-            <a:pPr algn="ctr">
-              <a:defRPr/>
-            </a:pPr>
-            <a:r>
-              <a:rPr kumimoji="1" lang="zh-CN" altLang="en-US" sz="1400" dirty="0" smtClean="0">
-                <a:latin typeface="Heiti SC Light" charset="-122"/>
-                <a:ea typeface="Heiti SC Light" charset="-122"/>
-                <a:cs typeface="Heiti SC Light" charset="-122"/>
-              </a:rPr>
-              <a:t>其他</a:t>
-            </a:r>
-            <a:endParaRPr kumimoji="1" lang="zh-CN" altLang="en-US" sz="1400" dirty="0">
-              <a:latin typeface="Heiti SC Light" charset="-122"/>
-              <a:ea typeface="Heiti SC Light" charset="-122"/>
-              <a:cs typeface="Heiti SC Light" charset="-122"/>
-            </a:endParaRPr>
-          </a:p>
-        </p:txBody>
-      </p:sp>
-      <p:sp>
-        <p:nvSpPr>
-          <p:cNvPr id="159" name="可选流程 158"/>
-          <p:cNvSpPr/>
-          <p:nvPr/>
-        </p:nvSpPr>
-        <p:spPr>
-          <a:xfrm>
-            <a:off x="2463148" y="2972582"/>
-            <a:ext cx="1535914" cy="251629"/>
-          </a:xfrm>
-          <a:prstGeom prst="flowChartAlternateProcess">
-            <a:avLst/>
-          </a:prstGeom>
-          <a:solidFill>
-            <a:srgbClr val="6095C9"/>
-          </a:solidFill>
-        </p:spPr>
-        <p:style>
-          <a:lnRef idx="0">
-            <a:schemeClr val="accent1"/>
-          </a:lnRef>
-          <a:fillRef idx="3">
-            <a:schemeClr val="accent1"/>
-          </a:fillRef>
-          <a:effectRef idx="3">
-            <a:schemeClr val="accent1"/>
-          </a:effectRef>
-          <a:fontRef idx="minor">
-            <a:schemeClr val="lt1"/>
-          </a:fontRef>
-        </p:style>
-        <p:txBody>
-          <a:bodyPr anchor="ctr"/>
-          <a:lstStyle/>
-          <a:p>
-            <a:pPr>
-              <a:defRPr/>
-            </a:pPr>
-            <a:r>
-              <a:rPr kumimoji="1" lang="zh-CN" altLang="en-US" sz="1400" dirty="0" smtClean="0">
-                <a:latin typeface="Heiti SC Light" charset="-122"/>
-                <a:ea typeface="Heiti SC Light" charset="-122"/>
-                <a:cs typeface="Heiti SC Light" charset="-122"/>
-              </a:rPr>
-              <a:t>运行报表</a:t>
-            </a:r>
-            <a:endParaRPr kumimoji="1" lang="zh-CN" altLang="en-US" sz="1400" dirty="0">
-              <a:latin typeface="Heiti SC Light" charset="-122"/>
-              <a:ea typeface="Heiti SC Light" charset="-122"/>
-              <a:cs typeface="Heiti SC Light" charset="-122"/>
-            </a:endParaRPr>
-          </a:p>
-        </p:txBody>
-      </p:sp>
-      <p:sp>
-        <p:nvSpPr>
-          <p:cNvPr id="160" name="可选流程 159"/>
-          <p:cNvSpPr/>
-          <p:nvPr/>
-        </p:nvSpPr>
-        <p:spPr>
-          <a:xfrm>
-            <a:off x="2463148" y="3363264"/>
-            <a:ext cx="1535914" cy="281598"/>
-          </a:xfrm>
-          <a:prstGeom prst="flowChartAlternateProcess">
-            <a:avLst/>
-          </a:prstGeom>
-          <a:solidFill>
-            <a:srgbClr val="6095C9"/>
-          </a:solidFill>
-        </p:spPr>
-        <p:style>
-          <a:lnRef idx="0">
-            <a:schemeClr val="accent1"/>
-          </a:lnRef>
-          <a:fillRef idx="3">
-            <a:schemeClr val="accent1"/>
-          </a:fillRef>
-          <a:effectRef idx="3">
-            <a:schemeClr val="accent1"/>
-          </a:effectRef>
-          <a:fontRef idx="minor">
-            <a:schemeClr val="lt1"/>
-          </a:fontRef>
-        </p:style>
-        <p:txBody>
-          <a:bodyPr anchor="ctr"/>
-          <a:lstStyle/>
-          <a:p>
-            <a:pPr>
-              <a:defRPr/>
-            </a:pPr>
-            <a:r>
-              <a:rPr kumimoji="1" lang="zh-CN" altLang="en-US" sz="1400" dirty="0" smtClean="0">
-                <a:latin typeface="Heiti SC Light" charset="-122"/>
-                <a:ea typeface="Heiti SC Light" charset="-122"/>
-                <a:cs typeface="Heiti SC Light" charset="-122"/>
-              </a:rPr>
-              <a:t>失败告警</a:t>
-            </a:r>
-            <a:endParaRPr kumimoji="1" lang="zh-CN" altLang="en-US" sz="1400" dirty="0">
-              <a:latin typeface="Heiti SC Light" charset="-122"/>
-              <a:ea typeface="Heiti SC Light" charset="-122"/>
-              <a:cs typeface="Heiti SC Light" charset="-122"/>
-            </a:endParaRPr>
-          </a:p>
-        </p:txBody>
-      </p:sp>
-      <p:sp>
-        <p:nvSpPr>
-          <p:cNvPr id="161" name="可选流程 160"/>
-          <p:cNvSpPr/>
-          <p:nvPr/>
-        </p:nvSpPr>
-        <p:spPr>
-          <a:xfrm>
-            <a:off x="2463148" y="3787601"/>
-            <a:ext cx="1535914" cy="255324"/>
-          </a:xfrm>
-          <a:prstGeom prst="flowChartAlternateProcess">
-            <a:avLst/>
-          </a:prstGeom>
-          <a:solidFill>
-            <a:srgbClr val="6095C9"/>
-          </a:solidFill>
-        </p:spPr>
-        <p:style>
-          <a:lnRef idx="0">
-            <a:schemeClr val="accent1"/>
-          </a:lnRef>
-          <a:fillRef idx="3">
-            <a:schemeClr val="accent1"/>
-          </a:fillRef>
-          <a:effectRef idx="3">
-            <a:schemeClr val="accent1"/>
-          </a:effectRef>
-          <a:fontRef idx="minor">
-            <a:schemeClr val="lt1"/>
-          </a:fontRef>
-        </p:style>
-        <p:txBody>
-          <a:bodyPr anchor="ctr"/>
-          <a:lstStyle/>
-          <a:p>
-            <a:pPr>
-              <a:defRPr/>
-            </a:pPr>
-            <a:r>
-              <a:rPr kumimoji="1" lang="zh-CN" altLang="en-US" sz="1400" dirty="0" smtClean="0">
-                <a:latin typeface="Heiti SC Light" charset="-122"/>
-                <a:ea typeface="Heiti SC Light" charset="-122"/>
-                <a:cs typeface="Heiti SC Light" charset="-122"/>
-              </a:rPr>
-              <a:t>任务依赖</a:t>
-            </a:r>
-            <a:endParaRPr kumimoji="1" lang="zh-CN" altLang="en-US" sz="1400" dirty="0">
-              <a:latin typeface="Heiti SC Light" charset="-122"/>
-              <a:ea typeface="Heiti SC Light" charset="-122"/>
-              <a:cs typeface="Heiti SC Light" charset="-122"/>
-            </a:endParaRPr>
-          </a:p>
-        </p:txBody>
-      </p:sp>
-      <p:sp>
-        <p:nvSpPr>
-          <p:cNvPr id="162" name="可选流程 161"/>
-          <p:cNvSpPr/>
-          <p:nvPr/>
-        </p:nvSpPr>
-        <p:spPr>
-          <a:xfrm>
-            <a:off x="2463148" y="4163682"/>
-            <a:ext cx="1535914" cy="274201"/>
-          </a:xfrm>
-          <a:prstGeom prst="flowChartAlternateProcess">
-            <a:avLst/>
-          </a:prstGeom>
-          <a:solidFill>
-            <a:srgbClr val="6095C9"/>
-          </a:solidFill>
-        </p:spPr>
-        <p:style>
-          <a:lnRef idx="0">
-            <a:schemeClr val="accent1"/>
-          </a:lnRef>
-          <a:fillRef idx="3">
-            <a:schemeClr val="accent1"/>
-          </a:fillRef>
-          <a:effectRef idx="3">
-            <a:schemeClr val="accent1"/>
-          </a:effectRef>
-          <a:fontRef idx="minor">
-            <a:schemeClr val="lt1"/>
-          </a:fontRef>
-        </p:style>
-        <p:txBody>
-          <a:bodyPr anchor="ctr"/>
-          <a:lstStyle/>
-          <a:p>
-            <a:pPr>
-              <a:defRPr/>
-            </a:pPr>
-            <a:r>
-              <a:rPr kumimoji="1" lang="en-US" altLang="zh-CN" sz="1400" dirty="0" smtClean="0">
-                <a:latin typeface="Heiti SC Light" charset="-122"/>
-                <a:ea typeface="Heiti SC Light" charset="-122"/>
-                <a:cs typeface="Heiti SC Light" charset="-122"/>
-              </a:rPr>
-              <a:t>……</a:t>
-            </a:r>
-            <a:endParaRPr kumimoji="1" lang="zh-CN" altLang="en-US" sz="1400" dirty="0">
-              <a:latin typeface="Heiti SC Light" charset="-122"/>
-              <a:ea typeface="Heiti SC Light" charset="-122"/>
-              <a:cs typeface="Heiti SC Light" charset="-122"/>
-            </a:endParaRPr>
-          </a:p>
-        </p:txBody>
-      </p:sp>
-      <p:sp>
-        <p:nvSpPr>
-          <p:cNvPr id="30" name="可选流程 29"/>
-          <p:cNvSpPr/>
-          <p:nvPr/>
-        </p:nvSpPr>
-        <p:spPr>
-          <a:xfrm>
-            <a:off x="7014111" y="4054200"/>
-            <a:ext cx="1837789" cy="572813"/>
-          </a:xfrm>
-          <a:prstGeom prst="flowChartAlternateProcess">
-            <a:avLst/>
-          </a:prstGeom>
-          <a:solidFill>
-            <a:srgbClr val="9379B3"/>
-          </a:solidFill>
-        </p:spPr>
-        <p:style>
-          <a:lnRef idx="0">
-            <a:schemeClr val="accent1"/>
-          </a:lnRef>
-          <a:fillRef idx="3">
-            <a:schemeClr val="accent1"/>
-          </a:fillRef>
-          <a:effectRef idx="3">
-            <a:schemeClr val="accent1"/>
-          </a:effectRef>
-          <a:fontRef idx="minor">
-            <a:schemeClr val="lt1"/>
-          </a:fontRef>
-        </p:style>
-        <p:txBody>
-          <a:bodyPr anchor="ctr"/>
-          <a:lstStyle/>
-          <a:p>
-            <a:pPr algn="ctr">
-              <a:defRPr/>
-            </a:pPr>
-            <a:r>
-              <a:rPr kumimoji="1" lang="zh-CN" altLang="en-US" sz="1400" dirty="0">
-                <a:latin typeface="Heiti SC Light" charset="-122"/>
-                <a:ea typeface="Heiti SC Light" charset="-122"/>
-                <a:cs typeface="Heiti SC Light" charset="-122"/>
-              </a:rPr>
-              <a:t>自动注册</a:t>
-            </a:r>
-          </a:p>
-          <a:p>
-            <a:pPr algn="ctr">
-              <a:defRPr/>
-            </a:pPr>
-            <a:r>
-              <a:rPr kumimoji="1" lang="en-US" altLang="zh-CN" sz="1400" dirty="0" smtClean="0">
-                <a:latin typeface="Heiti SC Light" charset="-122"/>
-                <a:ea typeface="Heiti SC Light" charset="-122"/>
-                <a:cs typeface="Heiti SC Light" charset="-122"/>
-              </a:rPr>
-              <a:t>(</a:t>
-            </a:r>
-            <a:r>
-              <a:rPr kumimoji="1" lang="zh-CN" altLang="en-US" sz="1400" dirty="0">
-                <a:latin typeface="Heiti SC Light" charset="-122"/>
-                <a:ea typeface="Heiti SC Light" charset="-122"/>
-                <a:cs typeface="Heiti SC Light" charset="-122"/>
-              </a:rPr>
-              <a:t>执行器</a:t>
-            </a:r>
-            <a:r>
-              <a:rPr kumimoji="1" lang="en-US" altLang="zh-CN" sz="1400" dirty="0" smtClean="0">
-                <a:latin typeface="Heiti SC Light" charset="-122"/>
-                <a:ea typeface="Heiti SC Light" charset="-122"/>
-                <a:cs typeface="Heiti SC Light" charset="-122"/>
-              </a:rPr>
-              <a:t>)</a:t>
-            </a:r>
-            <a:endParaRPr kumimoji="1" lang="zh-CN" altLang="en-US" sz="1400" dirty="0">
-              <a:latin typeface="Heiti SC Light" charset="-122"/>
-              <a:ea typeface="Heiti SC Light" charset="-122"/>
-              <a:cs typeface="Heiti SC Light" charset="-122"/>
-            </a:endParaRPr>
-          </a:p>
-        </p:txBody>
-      </p:sp>
-      <p:sp>
-        <p:nvSpPr>
-          <p:cNvPr id="97" name="可选流程 96"/>
-          <p:cNvSpPr/>
-          <p:nvPr/>
-        </p:nvSpPr>
-        <p:spPr>
-          <a:xfrm>
-            <a:off x="6989368" y="857386"/>
-            <a:ext cx="2444679" cy="586589"/>
-          </a:xfrm>
-          <a:prstGeom prst="flowChartAlternateProcess">
-            <a:avLst/>
-          </a:prstGeom>
-        </p:spPr>
-        <p:style>
-          <a:lnRef idx="0">
-            <a:schemeClr val="accent2"/>
-          </a:lnRef>
-          <a:fillRef idx="3">
-            <a:schemeClr val="accent2"/>
-          </a:fillRef>
-          <a:effectRef idx="3">
-            <a:schemeClr val="accent2"/>
-          </a:effectRef>
-          <a:fontRef idx="minor">
-            <a:schemeClr val="lt1"/>
-          </a:fontRef>
-        </p:style>
-        <p:txBody>
-          <a:bodyPr rtlCol="0" anchor="ctr"/>
-          <a:lstStyle/>
-          <a:p>
-            <a:pPr algn="ctr"/>
-            <a:r>
-              <a:rPr kumimoji="1" lang="zh-CN" altLang="en-US" sz="1400" dirty="0" smtClean="0">
-                <a:latin typeface="Heiti SC Light" charset="-122"/>
-                <a:ea typeface="Heiti SC Light" charset="-122"/>
-                <a:cs typeface="Heiti SC Light" charset="-122"/>
-              </a:rPr>
-              <a:t>执行器服务</a:t>
-            </a:r>
-            <a:r>
-              <a:rPr kumimoji="1" lang="en-US" altLang="zh-CN" sz="1400" dirty="0" smtClean="0">
-                <a:latin typeface="Heiti SC Light" charset="-122"/>
-                <a:ea typeface="Heiti SC Light" charset="-122"/>
-                <a:cs typeface="Heiti SC Light" charset="-122"/>
-              </a:rPr>
-              <a:t>(jetty)</a:t>
-            </a:r>
-            <a:endParaRPr kumimoji="1" lang="zh-CN" altLang="en-US" sz="1400" dirty="0">
-              <a:latin typeface="Heiti SC Light" charset="-122"/>
-              <a:ea typeface="Heiti SC Light" charset="-122"/>
-              <a:cs typeface="Heiti SC Light" charset="-122"/>
-            </a:endParaRPr>
-          </a:p>
-        </p:txBody>
-      </p:sp>
-      <p:cxnSp>
-        <p:nvCxnSpPr>
-          <p:cNvPr id="99" name="直线箭头连接符 98"/>
-          <p:cNvCxnSpPr>
-            <a:stCxn id="3" idx="3"/>
-          </p:cNvCxnSpPr>
-          <p:nvPr/>
-        </p:nvCxnSpPr>
-        <p:spPr>
-          <a:xfrm flipV="1">
-            <a:off x="5931089" y="1161234"/>
-            <a:ext cx="1041621" cy="2846"/>
-          </a:xfrm>
-          <a:prstGeom prst="straightConnector1">
-            <a:avLst/>
-          </a:prstGeom>
-          <a:ln w="28575">
-            <a:prstDash val="sysDash"/>
-            <a:headEnd type="none" w="med" len="med"/>
-            <a:tailEnd type="arrow" w="med" len="med"/>
-          </a:ln>
-        </p:spPr>
-        <p:style>
-          <a:lnRef idx="2">
-            <a:schemeClr val="accent1"/>
-          </a:lnRef>
-          <a:fillRef idx="0">
-            <a:schemeClr val="accent1"/>
-          </a:fillRef>
-          <a:effectRef idx="1">
-            <a:schemeClr val="accent1"/>
-          </a:effectRef>
-          <a:fontRef idx="minor">
-            <a:schemeClr val="tx1"/>
-          </a:fontRef>
-        </p:style>
-      </p:cxnSp>
-      <p:sp>
-        <p:nvSpPr>
-          <p:cNvPr id="169" name="矩形 168"/>
-          <p:cNvSpPr/>
-          <p:nvPr/>
-        </p:nvSpPr>
-        <p:spPr>
-          <a:xfrm>
-            <a:off x="9895204" y="688297"/>
-            <a:ext cx="1588645" cy="1867343"/>
-          </a:xfrm>
-          <a:prstGeom prst="rect">
-            <a:avLst/>
-          </a:prstGeom>
-          <a:solidFill>
-            <a:srgbClr val="DEF7FF"/>
-          </a:solidFill>
-          <a:ln>
-            <a:noFill/>
-          </a:ln>
-        </p:spPr>
-        <p:style>
-          <a:lnRef idx="1">
-            <a:schemeClr val="accent1"/>
-          </a:lnRef>
-          <a:fillRef idx="2">
-            <a:schemeClr val="accent1"/>
-          </a:fillRef>
-          <a:effectRef idx="1">
-            <a:schemeClr val="accent1"/>
-          </a:effectRef>
-          <a:fontRef idx="minor">
-            <a:schemeClr val="dk1"/>
-          </a:fontRef>
-        </p:style>
-        <p:txBody>
-          <a:bodyPr anchor="b"/>
-          <a:lstStyle/>
-          <a:p>
-            <a:pPr algn="ctr">
-              <a:defRPr/>
-            </a:pPr>
-            <a:endParaRPr kumimoji="1" lang="zh-CN" altLang="en-US" sz="1600" b="1" dirty="0">
-              <a:latin typeface="Heiti SC Light" charset="-122"/>
-              <a:ea typeface="Heiti SC Light" charset="-122"/>
-              <a:cs typeface="Heiti SC Light" charset="-122"/>
-            </a:endParaRPr>
-          </a:p>
-        </p:txBody>
-      </p:sp>
-      <p:cxnSp>
-        <p:nvCxnSpPr>
-          <p:cNvPr id="171" name="直线箭头连接符 170"/>
-          <p:cNvCxnSpPr/>
-          <p:nvPr/>
-        </p:nvCxnSpPr>
-        <p:spPr>
-          <a:xfrm>
-            <a:off x="9450705" y="1164079"/>
-            <a:ext cx="444499" cy="0"/>
-          </a:xfrm>
-          <a:prstGeom prst="straightConnector1">
-            <a:avLst/>
-          </a:prstGeom>
-          <a:ln w="28575">
-            <a:prstDash val="sysDash"/>
-            <a:headEnd type="none" w="med" len="med"/>
-            <a:tailEnd type="arrow" w="med" len="med"/>
-          </a:ln>
-        </p:spPr>
-        <p:style>
-          <a:lnRef idx="2">
-            <a:schemeClr val="accent1"/>
-          </a:lnRef>
-          <a:fillRef idx="0">
-            <a:schemeClr val="accent1"/>
-          </a:fillRef>
-          <a:effectRef idx="1">
-            <a:schemeClr val="accent1"/>
-          </a:effectRef>
-          <a:fontRef idx="minor">
-            <a:schemeClr val="tx1"/>
-          </a:fontRef>
-        </p:style>
-      </p:cxnSp>
-      <p:sp>
-        <p:nvSpPr>
-          <p:cNvPr id="177" name="矩形 176"/>
-          <p:cNvSpPr/>
-          <p:nvPr/>
-        </p:nvSpPr>
-        <p:spPr>
-          <a:xfrm>
-            <a:off x="7014562" y="1699038"/>
-            <a:ext cx="2531675" cy="856602"/>
-          </a:xfrm>
-          <a:prstGeom prst="rect">
-            <a:avLst/>
-          </a:prstGeom>
-          <a:solidFill>
-            <a:srgbClr val="E0EBFF"/>
-          </a:solidFill>
-          <a:ln>
-            <a:solidFill>
-              <a:srgbClr val="FFF2CD"/>
-            </a:solidFill>
-          </a:ln>
-        </p:spPr>
-        <p:style>
-          <a:lnRef idx="1">
-            <a:schemeClr val="accent1"/>
-          </a:lnRef>
-          <a:fillRef idx="2">
-            <a:schemeClr val="accent1"/>
-          </a:fillRef>
-          <a:effectRef idx="1">
-            <a:schemeClr val="accent1"/>
-          </a:effectRef>
-          <a:fontRef idx="minor">
-            <a:schemeClr val="dk1"/>
-          </a:fontRef>
-        </p:style>
-        <p:txBody>
-          <a:bodyPr anchor="b"/>
-          <a:lstStyle/>
-          <a:p>
-            <a:pPr algn="ctr">
-              <a:defRPr/>
-            </a:pPr>
-            <a:endParaRPr kumimoji="1" lang="zh-CN" altLang="en-US" sz="1600" b="1" dirty="0">
-              <a:latin typeface="Heiti SC Light" charset="-122"/>
-              <a:ea typeface="Heiti SC Light" charset="-122"/>
-              <a:cs typeface="Heiti SC Light" charset="-122"/>
-            </a:endParaRPr>
-          </a:p>
-        </p:txBody>
-      </p:sp>
-      <p:sp>
-        <p:nvSpPr>
-          <p:cNvPr id="178" name="磁盘 177"/>
-          <p:cNvSpPr/>
-          <p:nvPr/>
-        </p:nvSpPr>
-        <p:spPr>
-          <a:xfrm>
-            <a:off x="7126524" y="1789337"/>
-            <a:ext cx="1128362" cy="644066"/>
-          </a:xfrm>
-          <a:prstGeom prst="flowChartMagneticDisk">
-            <a:avLst/>
-          </a:prstGeom>
-        </p:spPr>
-        <p:style>
-          <a:lnRef idx="1">
-            <a:schemeClr val="accent4"/>
-          </a:lnRef>
-          <a:fillRef idx="2">
-            <a:schemeClr val="accent4"/>
-          </a:fillRef>
-          <a:effectRef idx="1">
-            <a:schemeClr val="accent4"/>
-          </a:effectRef>
-          <a:fontRef idx="minor">
-            <a:schemeClr val="dk1"/>
-          </a:fontRef>
-        </p:style>
-        <p:txBody>
-          <a:bodyPr rtlCol="0" anchor="ctr"/>
-          <a:lstStyle/>
-          <a:p>
-            <a:pPr algn="ctr"/>
-            <a:r>
-              <a:rPr kumimoji="1" lang="zh-CN" altLang="en-US" sz="1400" dirty="0" smtClean="0">
-                <a:latin typeface="Heiti SC Light" charset="-122"/>
-                <a:ea typeface="Heiti SC Light" charset="-122"/>
-                <a:cs typeface="Heiti SC Light" charset="-122"/>
-              </a:rPr>
-              <a:t>调度结果</a:t>
-            </a:r>
-          </a:p>
-          <a:p>
-            <a:pPr algn="ctr"/>
-            <a:r>
-              <a:rPr kumimoji="1" lang="en-US" altLang="zh-CN" sz="1400" dirty="0" smtClean="0">
-                <a:latin typeface="Heiti SC Light" charset="-122"/>
-                <a:ea typeface="Heiti SC Light" charset="-122"/>
-                <a:cs typeface="Heiti SC Light" charset="-122"/>
-              </a:rPr>
-              <a:t>(queue)</a:t>
-            </a:r>
-            <a:endParaRPr kumimoji="1" lang="zh-CN" altLang="en-US" sz="1400" dirty="0">
-              <a:latin typeface="Heiti SC Light" charset="-122"/>
-              <a:ea typeface="Heiti SC Light" charset="-122"/>
-              <a:cs typeface="Heiti SC Light" charset="-122"/>
-            </a:endParaRPr>
-          </a:p>
-        </p:txBody>
-      </p:sp>
-      <p:cxnSp>
-        <p:nvCxnSpPr>
-          <p:cNvPr id="182" name="直线箭头连接符 181"/>
-          <p:cNvCxnSpPr/>
-          <p:nvPr/>
-        </p:nvCxnSpPr>
-        <p:spPr>
-          <a:xfrm flipH="1" flipV="1">
-            <a:off x="9533537" y="2187570"/>
-            <a:ext cx="361667" cy="1"/>
-          </a:xfrm>
-          <a:prstGeom prst="straightConnector1">
-            <a:avLst/>
-          </a:prstGeom>
-          <a:ln w="28575">
-            <a:prstDash val="sysDash"/>
-            <a:headEnd type="none" w="med" len="med"/>
-            <a:tailEnd type="arrow" w="med" len="med"/>
-          </a:ln>
-        </p:spPr>
-        <p:style>
-          <a:lnRef idx="2">
-            <a:schemeClr val="accent1"/>
-          </a:lnRef>
-          <a:fillRef idx="0">
-            <a:schemeClr val="accent1"/>
-          </a:fillRef>
-          <a:effectRef idx="1">
-            <a:schemeClr val="accent1"/>
-          </a:effectRef>
-          <a:fontRef idx="minor">
-            <a:schemeClr val="tx1"/>
-          </a:fontRef>
-        </p:style>
-      </p:cxnSp>
-      <p:cxnSp>
-        <p:nvCxnSpPr>
-          <p:cNvPr id="185" name="直线箭头连接符 184"/>
-          <p:cNvCxnSpPr/>
-          <p:nvPr/>
-        </p:nvCxnSpPr>
-        <p:spPr>
-          <a:xfrm flipH="1">
-            <a:off x="5931088" y="2183395"/>
-            <a:ext cx="1083023" cy="11672"/>
-          </a:xfrm>
-          <a:prstGeom prst="straightConnector1">
-            <a:avLst/>
-          </a:prstGeom>
-          <a:ln w="28575">
-            <a:prstDash val="sysDash"/>
-            <a:headEnd type="none" w="med" len="med"/>
-            <a:tailEnd type="arrow" w="med" len="med"/>
-          </a:ln>
-        </p:spPr>
-        <p:style>
-          <a:lnRef idx="2">
-            <a:schemeClr val="accent1"/>
-          </a:lnRef>
-          <a:fillRef idx="0">
-            <a:schemeClr val="accent1"/>
-          </a:fillRef>
-          <a:effectRef idx="1">
-            <a:schemeClr val="accent1"/>
-          </a:effectRef>
-          <a:fontRef idx="minor">
-            <a:schemeClr val="tx1"/>
-          </a:fontRef>
-        </p:style>
-      </p:cxnSp>
-      <p:sp>
-        <p:nvSpPr>
-          <p:cNvPr id="194" name="可选流程 193"/>
-          <p:cNvSpPr/>
-          <p:nvPr/>
-        </p:nvSpPr>
-        <p:spPr>
-          <a:xfrm>
-            <a:off x="10032571" y="1561883"/>
-            <a:ext cx="1295671" cy="376213"/>
-          </a:xfrm>
-          <a:prstGeom prst="flowChartAlternateProcess">
-            <a:avLst/>
-          </a:prstGeom>
-          <a:solidFill>
-            <a:srgbClr val="4BACC6"/>
-          </a:solidFill>
-        </p:spPr>
-        <p:style>
-          <a:lnRef idx="0">
-            <a:schemeClr val="accent1"/>
-          </a:lnRef>
-          <a:fillRef idx="3">
-            <a:schemeClr val="accent1"/>
-          </a:fillRef>
-          <a:effectRef idx="3">
-            <a:schemeClr val="accent1"/>
-          </a:effectRef>
-          <a:fontRef idx="minor">
-            <a:schemeClr val="lt1"/>
-          </a:fontRef>
-        </p:style>
-        <p:txBody>
-          <a:bodyPr anchor="ctr"/>
-          <a:lstStyle/>
-          <a:p>
-            <a:pPr algn="ctr"/>
-            <a:r>
-              <a:rPr kumimoji="1" lang="en-US" altLang="zh-CN" sz="1400" dirty="0" err="1">
-                <a:latin typeface="Heiti SC Light" charset="-122"/>
-                <a:ea typeface="Heiti SC Light" charset="-122"/>
-                <a:cs typeface="Heiti SC Light" charset="-122"/>
-              </a:rPr>
-              <a:t>JobHandler</a:t>
-            </a:r>
-            <a:endParaRPr kumimoji="1" lang="zh-CN" altLang="en-US" sz="1400" dirty="0">
-              <a:latin typeface="Heiti SC Light" charset="-122"/>
-              <a:ea typeface="Heiti SC Light" charset="-122"/>
-              <a:cs typeface="Heiti SC Light" charset="-122"/>
-            </a:endParaRPr>
-          </a:p>
-        </p:txBody>
-      </p:sp>
-      <p:sp>
-        <p:nvSpPr>
-          <p:cNvPr id="195" name="可选流程 194"/>
-          <p:cNvSpPr/>
-          <p:nvPr/>
-        </p:nvSpPr>
-        <p:spPr>
-          <a:xfrm>
-            <a:off x="10032570" y="2077827"/>
-            <a:ext cx="1295671" cy="376213"/>
-          </a:xfrm>
-          <a:prstGeom prst="flowChartAlternateProcess">
-            <a:avLst/>
-          </a:prstGeom>
-          <a:solidFill>
-            <a:srgbClr val="4BACC6"/>
-          </a:solidFill>
-        </p:spPr>
-        <p:style>
-          <a:lnRef idx="0">
-            <a:schemeClr val="accent1"/>
-          </a:lnRef>
-          <a:fillRef idx="3">
-            <a:schemeClr val="accent1"/>
-          </a:fillRef>
-          <a:effectRef idx="3">
-            <a:schemeClr val="accent1"/>
-          </a:effectRef>
-          <a:fontRef idx="minor">
-            <a:schemeClr val="lt1"/>
-          </a:fontRef>
-        </p:style>
-        <p:txBody>
-          <a:bodyPr anchor="ctr"/>
-          <a:lstStyle/>
-          <a:p>
-            <a:pPr algn="ctr"/>
-            <a:r>
-              <a:rPr kumimoji="1" lang="zh-CN" altLang="en-US" sz="1400" dirty="0">
-                <a:latin typeface="Heiti SC Light" charset="-122"/>
-                <a:ea typeface="Heiti SC Light" charset="-122"/>
-                <a:cs typeface="Heiti SC Light" charset="-122"/>
-              </a:rPr>
-              <a:t>任务线程</a:t>
-            </a:r>
-          </a:p>
-        </p:txBody>
-      </p:sp>
-      <p:sp>
-        <p:nvSpPr>
-          <p:cNvPr id="196" name="磁盘 195"/>
-          <p:cNvSpPr/>
-          <p:nvPr/>
-        </p:nvSpPr>
-        <p:spPr>
-          <a:xfrm>
-            <a:off x="10032572" y="793337"/>
-            <a:ext cx="1295671" cy="663886"/>
-          </a:xfrm>
-          <a:prstGeom prst="flowChartMagneticDisk">
-            <a:avLst/>
-          </a:prstGeom>
-        </p:spPr>
-        <p:style>
-          <a:lnRef idx="1">
-            <a:schemeClr val="accent4"/>
-          </a:lnRef>
-          <a:fillRef idx="2">
-            <a:schemeClr val="accent4"/>
-          </a:fillRef>
-          <a:effectRef idx="1">
-            <a:schemeClr val="accent4"/>
-          </a:effectRef>
-          <a:fontRef idx="minor">
-            <a:schemeClr val="dk1"/>
-          </a:fontRef>
-        </p:style>
-        <p:txBody>
-          <a:bodyPr anchor="ctr"/>
-          <a:lstStyle/>
-          <a:p>
-            <a:pPr algn="ctr"/>
-            <a:r>
-              <a:rPr kumimoji="1" lang="zh-CN" altLang="en-US" sz="1400" dirty="0">
-                <a:latin typeface="Heiti SC Light" charset="-122"/>
-                <a:ea typeface="Heiti SC Light" charset="-122"/>
-                <a:cs typeface="Heiti SC Light" charset="-122"/>
-              </a:rPr>
-              <a:t>调度请求</a:t>
-            </a:r>
-          </a:p>
-          <a:p>
-            <a:pPr algn="ctr"/>
-            <a:r>
-              <a:rPr kumimoji="1" lang="en-US" altLang="zh-CN" sz="1400" dirty="0">
-                <a:latin typeface="Heiti SC Light" charset="-122"/>
-                <a:ea typeface="Heiti SC Light" charset="-122"/>
-                <a:cs typeface="Heiti SC Light" charset="-122"/>
-              </a:rPr>
-              <a:t>(queue)</a:t>
-            </a:r>
-            <a:endParaRPr kumimoji="1" lang="zh-CN" altLang="en-US" sz="1400" dirty="0">
-              <a:latin typeface="Heiti SC Light" charset="-122"/>
-              <a:ea typeface="Heiti SC Light" charset="-122"/>
-              <a:cs typeface="Heiti SC Light" charset="-122"/>
-            </a:endParaRPr>
-          </a:p>
-        </p:txBody>
-      </p:sp>
-      <p:sp>
-        <p:nvSpPr>
-          <p:cNvPr id="197" name="可选流程 196"/>
-          <p:cNvSpPr/>
-          <p:nvPr/>
-        </p:nvSpPr>
-        <p:spPr>
-          <a:xfrm>
-            <a:off x="8392252" y="1850828"/>
-            <a:ext cx="1066971" cy="554033"/>
-          </a:xfrm>
-          <a:prstGeom prst="flowChartAlternateProcess">
-            <a:avLst/>
-          </a:prstGeom>
-          <a:solidFill>
-            <a:srgbClr val="6095C9"/>
-          </a:solidFill>
-        </p:spPr>
-        <p:style>
-          <a:lnRef idx="0">
-            <a:schemeClr val="accent1"/>
-          </a:lnRef>
-          <a:fillRef idx="3">
-            <a:schemeClr val="accent1"/>
-          </a:fillRef>
-          <a:effectRef idx="3">
-            <a:schemeClr val="accent1"/>
-          </a:effectRef>
-          <a:fontRef idx="minor">
-            <a:schemeClr val="lt1"/>
-          </a:fontRef>
-        </p:style>
-        <p:txBody>
-          <a:bodyPr anchor="ctr"/>
-          <a:lstStyle/>
-          <a:p>
-            <a:pPr algn="ctr"/>
-            <a:r>
-              <a:rPr kumimoji="1" lang="zh-CN" altLang="en-US" sz="1400" dirty="0">
-                <a:latin typeface="Heiti SC Light" charset="-122"/>
-                <a:ea typeface="Heiti SC Light" charset="-122"/>
-                <a:cs typeface="Heiti SC Light" charset="-122"/>
-              </a:rPr>
-              <a:t>回调线程</a:t>
-            </a:r>
-          </a:p>
-        </p:txBody>
-      </p:sp>
-      <p:sp>
-        <p:nvSpPr>
-          <p:cNvPr id="203" name="圆角矩形 202"/>
-          <p:cNvSpPr/>
-          <p:nvPr/>
-        </p:nvSpPr>
-        <p:spPr>
-          <a:xfrm>
-            <a:off x="7014111" y="2893987"/>
-            <a:ext cx="4447045" cy="585805"/>
-          </a:xfrm>
-          <a:prstGeom prst="roundRect">
-            <a:avLst/>
-          </a:prstGeom>
-          <a:solidFill>
-            <a:srgbClr val="58B8D1"/>
-          </a:solidFill>
-        </p:spPr>
-        <p:style>
-          <a:lnRef idx="0">
-            <a:schemeClr val="accent1"/>
-          </a:lnRef>
-          <a:fillRef idx="3">
-            <a:schemeClr val="accent1"/>
-          </a:fillRef>
-          <a:effectRef idx="3">
-            <a:schemeClr val="accent1"/>
-          </a:effectRef>
-          <a:fontRef idx="minor">
-            <a:schemeClr val="lt1"/>
-          </a:fontRef>
-        </p:style>
-        <p:txBody>
-          <a:bodyPr anchor="ctr"/>
-          <a:lstStyle/>
-          <a:p>
-            <a:pPr algn="ctr">
-              <a:defRPr/>
-            </a:pPr>
-            <a:r>
-              <a:rPr kumimoji="1" lang="zh-CN" altLang="en-US" sz="1400" dirty="0" smtClean="0">
-                <a:latin typeface="Heiti SC Light" charset="-122"/>
-                <a:ea typeface="Heiti SC Light" charset="-122"/>
-                <a:cs typeface="Heiti SC Light" charset="-122"/>
-              </a:rPr>
-              <a:t>任务执行日志</a:t>
-            </a:r>
-            <a:r>
-              <a:rPr kumimoji="1" lang="en-US" altLang="zh-CN" sz="1400" dirty="0" smtClean="0">
-                <a:latin typeface="Heiti SC Light" charset="-122"/>
-                <a:ea typeface="Heiti SC Light" charset="-122"/>
-                <a:cs typeface="Heiti SC Light" charset="-122"/>
-              </a:rPr>
-              <a:t>/</a:t>
-            </a:r>
-            <a:r>
-              <a:rPr kumimoji="1" lang="zh-CN" altLang="en-US" sz="1400" dirty="0" smtClean="0">
-                <a:latin typeface="Heiti SC Light" charset="-122"/>
-                <a:ea typeface="Heiti SC Light" charset="-122"/>
-                <a:cs typeface="Heiti SC Light" charset="-122"/>
-              </a:rPr>
-              <a:t>回调日志</a:t>
-            </a:r>
-          </a:p>
-          <a:p>
-            <a:pPr algn="ctr">
-              <a:defRPr/>
-            </a:pPr>
-            <a:r>
-              <a:rPr kumimoji="1" lang="en-US" altLang="zh-CN" sz="1400" dirty="0" smtClean="0">
-                <a:latin typeface="Heiti SC Light" charset="-122"/>
-                <a:ea typeface="Heiti SC Light" charset="-122"/>
-                <a:cs typeface="Heiti SC Light" charset="-122"/>
-              </a:rPr>
-              <a:t>(</a:t>
-            </a:r>
-            <a:r>
-              <a:rPr kumimoji="1" lang="en-US" altLang="zh-CN" sz="1400" dirty="0">
-                <a:latin typeface="Heiti SC Light" charset="-122"/>
-                <a:ea typeface="Heiti SC Light" charset="-122"/>
-                <a:cs typeface="Heiti SC Light" charset="-122"/>
-              </a:rPr>
-              <a:t>Log</a:t>
-            </a:r>
-            <a:r>
-              <a:rPr kumimoji="1" lang="zh-CN" altLang="en-US" sz="1400" dirty="0">
-                <a:latin typeface="Heiti SC Light" charset="-122"/>
-                <a:ea typeface="Heiti SC Light" charset="-122"/>
-                <a:cs typeface="Heiti SC Light" charset="-122"/>
-              </a:rPr>
-              <a:t>文件</a:t>
-            </a:r>
-            <a:r>
-              <a:rPr kumimoji="1" lang="en-US" altLang="zh-CN" sz="1400" dirty="0" smtClean="0">
-                <a:latin typeface="Heiti SC Light" charset="-122"/>
-                <a:ea typeface="Heiti SC Light" charset="-122"/>
-                <a:cs typeface="Heiti SC Light" charset="-122"/>
-              </a:rPr>
-              <a:t>)</a:t>
-            </a:r>
-            <a:endParaRPr kumimoji="1" lang="zh-CN" altLang="en-US" sz="1400" dirty="0">
-              <a:latin typeface="Heiti SC Light" charset="-122"/>
-              <a:ea typeface="Heiti SC Light" charset="-122"/>
-              <a:cs typeface="Heiti SC Light" charset="-122"/>
-            </a:endParaRPr>
-          </a:p>
-        </p:txBody>
-      </p:sp>
-      <p:cxnSp>
-        <p:nvCxnSpPr>
-          <p:cNvPr id="204" name="直线箭头连接符 203"/>
-          <p:cNvCxnSpPr/>
-          <p:nvPr/>
-        </p:nvCxnSpPr>
-        <p:spPr>
-          <a:xfrm>
-            <a:off x="10668000" y="2555640"/>
-            <a:ext cx="0" cy="338347"/>
-          </a:xfrm>
-          <a:prstGeom prst="straightConnector1">
-            <a:avLst/>
-          </a:prstGeom>
-          <a:ln w="28575">
-            <a:prstDash val="sysDash"/>
-            <a:headEnd type="none" w="med" len="med"/>
-            <a:tailEnd type="arrow" w="med" len="med"/>
-          </a:ln>
-        </p:spPr>
-        <p:style>
-          <a:lnRef idx="2">
-            <a:schemeClr val="accent1"/>
-          </a:lnRef>
-          <a:fillRef idx="0">
-            <a:schemeClr val="accent1"/>
-          </a:fillRef>
-          <a:effectRef idx="1">
-            <a:schemeClr val="accent1"/>
-          </a:effectRef>
-          <a:fontRef idx="minor">
-            <a:schemeClr val="tx1"/>
-          </a:fontRef>
-        </p:style>
-      </p:cxnSp>
-      <p:cxnSp>
-        <p:nvCxnSpPr>
-          <p:cNvPr id="207" name="直线箭头连接符 206"/>
-          <p:cNvCxnSpPr>
-            <a:stCxn id="203" idx="1"/>
-            <a:endCxn id="74" idx="3"/>
-          </p:cNvCxnSpPr>
-          <p:nvPr/>
-        </p:nvCxnSpPr>
-        <p:spPr>
-          <a:xfrm flipH="1">
-            <a:off x="5931088" y="3186890"/>
-            <a:ext cx="1083023" cy="1"/>
-          </a:xfrm>
-          <a:prstGeom prst="straightConnector1">
-            <a:avLst/>
-          </a:prstGeom>
-          <a:ln w="28575">
-            <a:prstDash val="sysDash"/>
-            <a:headEnd type="none" w="med" len="med"/>
-            <a:tailEnd type="arrow" w="med" len="med"/>
-          </a:ln>
-        </p:spPr>
-        <p:style>
-          <a:lnRef idx="2">
-            <a:schemeClr val="accent1"/>
-          </a:lnRef>
-          <a:fillRef idx="0">
-            <a:schemeClr val="accent1"/>
-          </a:fillRef>
-          <a:effectRef idx="1">
-            <a:schemeClr val="accent1"/>
-          </a:effectRef>
-          <a:fontRef idx="minor">
-            <a:schemeClr val="tx1"/>
-          </a:fontRef>
-        </p:style>
-      </p:cxnSp>
-      <p:sp>
-        <p:nvSpPr>
-          <p:cNvPr id="57" name="圆角矩形 56"/>
-          <p:cNvSpPr/>
-          <p:nvPr/>
-        </p:nvSpPr>
-        <p:spPr>
-          <a:xfrm>
-            <a:off x="9546237" y="4047703"/>
-            <a:ext cx="1937612" cy="571579"/>
-          </a:xfrm>
-          <a:prstGeom prst="roundRect">
-            <a:avLst/>
-          </a:prstGeom>
-          <a:solidFill>
-            <a:srgbClr val="58B8D1"/>
-          </a:solidFill>
-        </p:spPr>
-        <p:style>
-          <a:lnRef idx="0">
-            <a:schemeClr val="accent1"/>
-          </a:lnRef>
-          <a:fillRef idx="3">
-            <a:schemeClr val="accent1"/>
-          </a:fillRef>
-          <a:effectRef idx="3">
-            <a:schemeClr val="accent1"/>
-          </a:effectRef>
-          <a:fontRef idx="minor">
-            <a:schemeClr val="lt1"/>
-          </a:fontRef>
-        </p:style>
-        <p:txBody>
-          <a:bodyPr anchor="ctr"/>
-          <a:lstStyle/>
-          <a:p>
-            <a:pPr algn="ctr">
-              <a:defRPr/>
-            </a:pPr>
-            <a:r>
-              <a:rPr kumimoji="1" lang="zh-CN" altLang="en-US" sz="1400" dirty="0">
-                <a:latin typeface="Heiti SC Light" charset="-122"/>
-                <a:ea typeface="Heiti SC Light" charset="-122"/>
-                <a:cs typeface="Heiti SC Light" charset="-122"/>
-              </a:rPr>
-              <a:t>自研</a:t>
-            </a:r>
-            <a:r>
-              <a:rPr kumimoji="1" lang="en-US" altLang="zh-CN" sz="1400" dirty="0">
-                <a:latin typeface="Heiti SC Light" charset="-122"/>
-                <a:ea typeface="Heiti SC Light" charset="-122"/>
-                <a:cs typeface="Heiti SC Light" charset="-122"/>
-              </a:rPr>
-              <a:t>RPC</a:t>
-            </a:r>
-            <a:endParaRPr kumimoji="1" lang="zh-CN" altLang="en-US" sz="1400" dirty="0">
-              <a:latin typeface="Heiti SC Light" charset="-122"/>
-              <a:ea typeface="Heiti SC Light" charset="-122"/>
-              <a:cs typeface="Heiti SC Light" charset="-122"/>
-            </a:endParaRPr>
-          </a:p>
-        </p:txBody>
-      </p:sp>
-    </p:spTree>
-    <p:extLst>
-      <p:ext uri="{BB962C8B-B14F-4D97-AF65-F5344CB8AC3E}">
-        <p14:creationId xmlns:p14="http://schemas.microsoft.com/office/powerpoint/2010/main" val="1678395511"/>
-      </p:ext>
-    </p:extLst>
-  </p:cSld>
-  <p:clrMapOvr>
-    <a:masterClrMapping/>
-  </p:clrMapOvr>
-  <p:timing>
-    <p:tnLst>
-      <p:par>
-        <p:cTn id="1" dur="indefinite" restart="never" nodeType="tmRoot"/>
-      </p:par>
-    </p:tnLst>
-  </p:timing>
 </p:sld>
 </file>
 

</xml_diff>